<commit_message>
kubus and kubus 2
- revised design
- added 2nd cube answering 2nd business question
</commit_message>
<xml_diff>
--- a/kubus.pptx
+++ b/kubus.pptx
@@ -272,7 +272,7 @@
           <a:p>
             <a:fld id="{F56798F9-AB24-4B17-9A49-23B08BF63D1B}" type="datetimeFigureOut">
               <a:rPr lang="nl-NL" smtClean="0"/>
-              <a:t>21-11-2020</a:t>
+              <a:t>23-11-2020</a:t>
             </a:fld>
             <a:endParaRPr lang="nl-NL"/>
           </a:p>
@@ -472,7 +472,7 @@
           <a:p>
             <a:fld id="{F56798F9-AB24-4B17-9A49-23B08BF63D1B}" type="datetimeFigureOut">
               <a:rPr lang="nl-NL" smtClean="0"/>
-              <a:t>21-11-2020</a:t>
+              <a:t>23-11-2020</a:t>
             </a:fld>
             <a:endParaRPr lang="nl-NL"/>
           </a:p>
@@ -682,7 +682,7 @@
           <a:p>
             <a:fld id="{F56798F9-AB24-4B17-9A49-23B08BF63D1B}" type="datetimeFigureOut">
               <a:rPr lang="nl-NL" smtClean="0"/>
-              <a:t>21-11-2020</a:t>
+              <a:t>23-11-2020</a:t>
             </a:fld>
             <a:endParaRPr lang="nl-NL"/>
           </a:p>
@@ -882,7 +882,7 @@
           <a:p>
             <a:fld id="{F56798F9-AB24-4B17-9A49-23B08BF63D1B}" type="datetimeFigureOut">
               <a:rPr lang="nl-NL" smtClean="0"/>
-              <a:t>21-11-2020</a:t>
+              <a:t>23-11-2020</a:t>
             </a:fld>
             <a:endParaRPr lang="nl-NL"/>
           </a:p>
@@ -1158,7 +1158,7 @@
           <a:p>
             <a:fld id="{F56798F9-AB24-4B17-9A49-23B08BF63D1B}" type="datetimeFigureOut">
               <a:rPr lang="nl-NL" smtClean="0"/>
-              <a:t>21-11-2020</a:t>
+              <a:t>23-11-2020</a:t>
             </a:fld>
             <a:endParaRPr lang="nl-NL"/>
           </a:p>
@@ -1426,7 +1426,7 @@
           <a:p>
             <a:fld id="{F56798F9-AB24-4B17-9A49-23B08BF63D1B}" type="datetimeFigureOut">
               <a:rPr lang="nl-NL" smtClean="0"/>
-              <a:t>21-11-2020</a:t>
+              <a:t>23-11-2020</a:t>
             </a:fld>
             <a:endParaRPr lang="nl-NL"/>
           </a:p>
@@ -1841,7 +1841,7 @@
           <a:p>
             <a:fld id="{F56798F9-AB24-4B17-9A49-23B08BF63D1B}" type="datetimeFigureOut">
               <a:rPr lang="nl-NL" smtClean="0"/>
-              <a:t>21-11-2020</a:t>
+              <a:t>23-11-2020</a:t>
             </a:fld>
             <a:endParaRPr lang="nl-NL"/>
           </a:p>
@@ -1983,7 +1983,7 @@
           <a:p>
             <a:fld id="{F56798F9-AB24-4B17-9A49-23B08BF63D1B}" type="datetimeFigureOut">
               <a:rPr lang="nl-NL" smtClean="0"/>
-              <a:t>21-11-2020</a:t>
+              <a:t>23-11-2020</a:t>
             </a:fld>
             <a:endParaRPr lang="nl-NL"/>
           </a:p>
@@ -2096,7 +2096,7 @@
           <a:p>
             <a:fld id="{F56798F9-AB24-4B17-9A49-23B08BF63D1B}" type="datetimeFigureOut">
               <a:rPr lang="nl-NL" smtClean="0"/>
-              <a:t>21-11-2020</a:t>
+              <a:t>23-11-2020</a:t>
             </a:fld>
             <a:endParaRPr lang="nl-NL"/>
           </a:p>
@@ -2409,7 +2409,7 @@
           <a:p>
             <a:fld id="{F56798F9-AB24-4B17-9A49-23B08BF63D1B}" type="datetimeFigureOut">
               <a:rPr lang="nl-NL" smtClean="0"/>
-              <a:t>21-11-2020</a:t>
+              <a:t>23-11-2020</a:t>
             </a:fld>
             <a:endParaRPr lang="nl-NL"/>
           </a:p>
@@ -2698,7 +2698,7 @@
           <a:p>
             <a:fld id="{F56798F9-AB24-4B17-9A49-23B08BF63D1B}" type="datetimeFigureOut">
               <a:rPr lang="nl-NL" smtClean="0"/>
-              <a:t>21-11-2020</a:t>
+              <a:t>23-11-2020</a:t>
             </a:fld>
             <a:endParaRPr lang="nl-NL"/>
           </a:p>
@@ -2941,7 +2941,7 @@
           <a:p>
             <a:fld id="{F56798F9-AB24-4B17-9A49-23B08BF63D1B}" type="datetimeFigureOut">
               <a:rPr lang="nl-NL" smtClean="0"/>
-              <a:t>21-11-2020</a:t>
+              <a:t>23-11-2020</a:t>
             </a:fld>
             <a:endParaRPr lang="nl-NL"/>
           </a:p>
@@ -7781,2241 +7781,2324 @@
           </p:txBody>
         </p:sp>
       </p:grpSp>
-      <p:cxnSp>
-        <p:nvCxnSpPr>
-          <p:cNvPr id="172" name="Straight Arrow Connector 171">
-            <a:extLst>
-              <a:ext uri="{FF2B5EF4-FFF2-40B4-BE49-F238E27FC236}">
-                <a16:creationId xmlns:a16="http://schemas.microsoft.com/office/drawing/2014/main" id="{A4125B5C-2407-4538-9911-0AF8B12878FF}"/>
-              </a:ext>
-            </a:extLst>
-          </p:cNvPr>
-          <p:cNvCxnSpPr>
-            <a:cxnSpLocks/>
-          </p:cNvCxnSpPr>
+      <p:sp>
+        <p:nvSpPr>
+          <p:cNvPr id="3" name="Teardrop 2">
+            <a:extLst>
+              <a:ext uri="{FF2B5EF4-FFF2-40B4-BE49-F238E27FC236}">
+                <a16:creationId xmlns:a16="http://schemas.microsoft.com/office/drawing/2014/main" id="{75FFF4D7-1F3A-A74B-B7E9-D526DC9D19A6}"/>
+              </a:ext>
+            </a:extLst>
+          </p:cNvPr>
+          <p:cNvSpPr/>
           <p:nvPr/>
-        </p:nvCxnSpPr>
+        </p:nvSpPr>
         <p:spPr>
-          <a:xfrm flipH="1">
-            <a:off x="9675004" y="2734963"/>
-            <a:ext cx="488949" cy="183587"/>
+          <a:xfrm rot="10961744">
+            <a:off x="8105093" y="932306"/>
+            <a:ext cx="2502053" cy="2382096"/>
           </a:xfrm>
-          <a:prstGeom prst="straightConnector1">
-            <a:avLst/>
+          <a:prstGeom prst="teardrop">
+            <a:avLst>
+              <a:gd name="adj" fmla="val 135140"/>
+            </a:avLst>
           </a:prstGeom>
-          <a:ln w="19050" cap="rnd">
+          <a:solidFill>
+            <a:schemeClr val="bg2">
+              <a:lumMod val="90000"/>
+              <a:alpha val="25000"/>
+            </a:schemeClr>
+          </a:solidFill>
+          <a:ln w="12700">
             <a:solidFill>
-              <a:schemeClr val="bg2">
-                <a:lumMod val="50000"/>
+              <a:schemeClr val="tx1">
+                <a:lumMod val="65000"/>
+                <a:lumOff val="35000"/>
               </a:schemeClr>
             </a:solidFill>
-            <a:bevel/>
-            <a:headEnd type="oval" w="sm" len="med"/>
-            <a:tailEnd type="oval" w="sm" len="med"/>
           </a:ln>
         </p:spPr>
         <p:style>
-          <a:lnRef idx="1">
-            <a:schemeClr val="accent1"/>
+          <a:lnRef idx="2">
+            <a:schemeClr val="accent1">
+              <a:shade val="50000"/>
+            </a:schemeClr>
           </a:lnRef>
-          <a:fillRef idx="0">
+          <a:fillRef idx="1">
             <a:schemeClr val="accent1"/>
           </a:fillRef>
           <a:effectRef idx="0">
             <a:schemeClr val="accent1"/>
           </a:effectRef>
           <a:fontRef idx="minor">
-            <a:schemeClr val="tx1"/>
+            <a:schemeClr val="lt1"/>
           </a:fontRef>
         </p:style>
-      </p:cxnSp>
-      <p:cxnSp>
-        <p:nvCxnSpPr>
-          <p:cNvPr id="173" name="Straight Arrow Connector 172">
-            <a:extLst>
-              <a:ext uri="{FF2B5EF4-FFF2-40B4-BE49-F238E27FC236}">
-                <a16:creationId xmlns:a16="http://schemas.microsoft.com/office/drawing/2014/main" id="{9B07276B-27EC-4298-8BB8-CE39627DE643}"/>
-              </a:ext>
-            </a:extLst>
-          </p:cNvPr>
-          <p:cNvCxnSpPr>
-            <a:cxnSpLocks/>
-          </p:cNvCxnSpPr>
+        <p:txBody>
+          <a:bodyPr rtlCol="0" anchor="ctr"/>
+          <a:lstStyle/>
+          <a:p>
+            <a:pPr algn="ctr"/>
+            <a:endParaRPr lang="en-NL" dirty="0"/>
+          </a:p>
+        </p:txBody>
+      </p:sp>
+      <p:grpSp>
+        <p:nvGrpSpPr>
+          <p:cNvPr id="4" name="Group 3">
+            <a:extLst>
+              <a:ext uri="{FF2B5EF4-FFF2-40B4-BE49-F238E27FC236}">
+                <a16:creationId xmlns:a16="http://schemas.microsoft.com/office/drawing/2014/main" id="{DCB04413-A16B-7342-BA5F-5CB660D898A0}"/>
+              </a:ext>
+            </a:extLst>
+          </p:cNvPr>
+          <p:cNvGrpSpPr/>
           <p:nvPr/>
-        </p:nvCxnSpPr>
-        <p:spPr>
-          <a:xfrm flipH="1">
-            <a:off x="9921596" y="2805097"/>
-            <a:ext cx="55032" cy="20085"/>
+        </p:nvGrpSpPr>
+        <p:grpSpPr>
+          <a:xfrm>
+            <a:off x="8194676" y="1253945"/>
+            <a:ext cx="2222604" cy="1672875"/>
+            <a:chOff x="8278261" y="1452315"/>
+            <a:chExt cx="2222604" cy="1672875"/>
           </a:xfrm>
-          <a:prstGeom prst="straightConnector1">
-            <a:avLst/>
-          </a:prstGeom>
-          <a:ln w="0" cap="rnd">
-            <a:solidFill>
-              <a:schemeClr val="bg2">
-                <a:lumMod val="50000"/>
-              </a:schemeClr>
-            </a:solidFill>
-            <a:bevel/>
-            <a:headEnd type="none"/>
-            <a:tailEnd type="oval" w="sm" len="med"/>
-          </a:ln>
-        </p:spPr>
-        <p:style>
-          <a:lnRef idx="1">
-            <a:schemeClr val="accent1"/>
-          </a:lnRef>
-          <a:fillRef idx="0">
-            <a:schemeClr val="accent1"/>
-          </a:fillRef>
-          <a:effectRef idx="0">
-            <a:schemeClr val="accent1"/>
-          </a:effectRef>
-          <a:fontRef idx="minor">
-            <a:schemeClr val="tx1"/>
-          </a:fontRef>
-        </p:style>
-      </p:cxnSp>
-      <p:sp>
-        <p:nvSpPr>
-          <p:cNvPr id="174" name="TextBox 173">
-            <a:extLst>
-              <a:ext uri="{FF2B5EF4-FFF2-40B4-BE49-F238E27FC236}">
-                <a16:creationId xmlns:a16="http://schemas.microsoft.com/office/drawing/2014/main" id="{6D72DC01-6433-4B3A-A6CA-D66787BEC436}"/>
-              </a:ext>
-            </a:extLst>
-          </p:cNvPr>
-          <p:cNvSpPr txBox="1"/>
-          <p:nvPr/>
-        </p:nvSpPr>
-        <p:spPr>
-          <a:xfrm>
-            <a:off x="9140401" y="2876735"/>
-            <a:ext cx="388248" cy="215444"/>
-          </a:xfrm>
-          <a:prstGeom prst="rect">
-            <a:avLst/>
-          </a:prstGeom>
-          <a:noFill/>
-        </p:spPr>
-        <p:txBody>
-          <a:bodyPr wrap="none" rtlCol="0">
-            <a:spAutoFit/>
-          </a:bodyPr>
-          <a:lstStyle/>
-          <a:p>
-            <a:r>
-              <a:rPr lang="en-GB" sz="800" b="1" dirty="0">
-                <a:solidFill>
-                  <a:schemeClr val="bg2">
-                    <a:lumMod val="50000"/>
-                  </a:schemeClr>
-                </a:solidFill>
-              </a:rPr>
-              <a:t>Race</a:t>
-            </a:r>
-            <a:endParaRPr lang="nl-NL" b="1" dirty="0">
+        </p:grpSpPr>
+        <p:cxnSp>
+          <p:nvCxnSpPr>
+            <p:cNvPr id="172" name="Straight Arrow Connector 171">
+              <a:extLst>
+                <a:ext uri="{FF2B5EF4-FFF2-40B4-BE49-F238E27FC236}">
+                  <a16:creationId xmlns:a16="http://schemas.microsoft.com/office/drawing/2014/main" id="{A4125B5C-2407-4538-9911-0AF8B12878FF}"/>
+                </a:ext>
+              </a:extLst>
+            </p:cNvPr>
+            <p:cNvCxnSpPr>
+              <a:cxnSpLocks/>
+            </p:cNvCxnSpPr>
+            <p:nvPr/>
+          </p:nvCxnSpPr>
+          <p:spPr>
+            <a:xfrm flipH="1">
+              <a:off x="9675004" y="2734963"/>
+              <a:ext cx="488949" cy="183587"/>
+            </a:xfrm>
+            <a:prstGeom prst="straightConnector1">
+              <a:avLst/>
+            </a:prstGeom>
+            <a:ln w="19050" cap="rnd">
               <a:solidFill>
                 <a:schemeClr val="bg2">
                   <a:lumMod val="50000"/>
                 </a:schemeClr>
               </a:solidFill>
-            </a:endParaRPr>
-          </a:p>
-        </p:txBody>
-      </p:sp>
-      <p:sp>
-        <p:nvSpPr>
-          <p:cNvPr id="176" name="TextBox 175">
-            <a:extLst>
-              <a:ext uri="{FF2B5EF4-FFF2-40B4-BE49-F238E27FC236}">
-                <a16:creationId xmlns:a16="http://schemas.microsoft.com/office/drawing/2014/main" id="{5DBB4E6A-B5EC-43B5-ACC8-04E269376404}"/>
-              </a:ext>
-            </a:extLst>
-          </p:cNvPr>
-          <p:cNvSpPr txBox="1"/>
-          <p:nvPr/>
-        </p:nvSpPr>
-        <p:spPr>
-          <a:xfrm>
-            <a:off x="9548053" y="2909746"/>
-            <a:ext cx="514885" cy="215444"/>
-          </a:xfrm>
-          <a:prstGeom prst="rect">
-            <a:avLst/>
-          </a:prstGeom>
-          <a:noFill/>
-        </p:spPr>
-        <p:txBody>
-          <a:bodyPr wrap="none" rtlCol="0">
-            <a:spAutoFit/>
-          </a:bodyPr>
-          <a:lstStyle/>
-          <a:p>
-            <a:r>
-              <a:rPr lang="en-GB" sz="800" b="1" dirty="0">
-                <a:solidFill>
-                  <a:schemeClr val="bg2">
-                    <a:lumMod val="50000"/>
-                  </a:schemeClr>
-                </a:solidFill>
-              </a:rPr>
-              <a:t>January</a:t>
-            </a:r>
-            <a:endParaRPr lang="nl-NL" b="1" dirty="0">
-              <a:solidFill>
-                <a:schemeClr val="bg2">
-                  <a:lumMod val="50000"/>
-                </a:schemeClr>
-              </a:solidFill>
-            </a:endParaRPr>
-          </a:p>
-        </p:txBody>
-      </p:sp>
-      <p:cxnSp>
-        <p:nvCxnSpPr>
-          <p:cNvPr id="178" name="Straight Arrow Connector 177">
-            <a:extLst>
-              <a:ext uri="{FF2B5EF4-FFF2-40B4-BE49-F238E27FC236}">
-                <a16:creationId xmlns:a16="http://schemas.microsoft.com/office/drawing/2014/main" id="{0F760C7C-2E25-4302-8A62-C5BDBF119272}"/>
-              </a:ext>
-            </a:extLst>
-          </p:cNvPr>
-          <p:cNvCxnSpPr>
-            <a:cxnSpLocks/>
-          </p:cNvCxnSpPr>
-          <p:nvPr/>
-        </p:nvCxnSpPr>
-        <p:spPr>
-          <a:xfrm>
-            <a:off x="8922834" y="2737729"/>
-            <a:ext cx="250859" cy="92329"/>
-          </a:xfrm>
-          <a:prstGeom prst="straightConnector1">
-            <a:avLst/>
-          </a:prstGeom>
-          <a:ln w="19050" cap="rnd">
-            <a:solidFill>
-              <a:schemeClr val="bg2">
-                <a:lumMod val="50000"/>
-              </a:schemeClr>
-            </a:solidFill>
-            <a:round/>
-            <a:headEnd type="oval" w="sm" len="med"/>
-            <a:tailEnd type="oval" w="sm" len="med"/>
-          </a:ln>
-        </p:spPr>
-        <p:style>
-          <a:lnRef idx="1">
-            <a:schemeClr val="accent1"/>
-          </a:lnRef>
-          <a:fillRef idx="0">
-            <a:schemeClr val="accent1"/>
-          </a:fillRef>
-          <a:effectRef idx="0">
-            <a:schemeClr val="accent1"/>
-          </a:effectRef>
-          <a:fontRef idx="minor">
-            <a:schemeClr val="tx1"/>
-          </a:fontRef>
-        </p:style>
-      </p:cxnSp>
-      <p:cxnSp>
-        <p:nvCxnSpPr>
-          <p:cNvPr id="179" name="Straight Arrow Connector 178">
-            <a:extLst>
-              <a:ext uri="{FF2B5EF4-FFF2-40B4-BE49-F238E27FC236}">
-                <a16:creationId xmlns:a16="http://schemas.microsoft.com/office/drawing/2014/main" id="{9384F56E-3A25-4BC4-8082-68B044DEB6F1}"/>
-              </a:ext>
-            </a:extLst>
-          </p:cNvPr>
-          <p:cNvCxnSpPr>
-            <a:cxnSpLocks/>
-          </p:cNvCxnSpPr>
-          <p:nvPr/>
-        </p:nvCxnSpPr>
-        <p:spPr>
-          <a:xfrm>
-            <a:off x="9157268" y="2822935"/>
-            <a:ext cx="241635" cy="90668"/>
-          </a:xfrm>
-          <a:prstGeom prst="straightConnector1">
-            <a:avLst/>
-          </a:prstGeom>
-          <a:ln w="19050" cap="rnd">
-            <a:solidFill>
-              <a:schemeClr val="bg2">
-                <a:lumMod val="50000"/>
-              </a:schemeClr>
-            </a:solidFill>
-            <a:round/>
-            <a:headEnd type="none"/>
-            <a:tailEnd type="oval" w="sm" len="med"/>
-          </a:ln>
-        </p:spPr>
-        <p:style>
-          <a:lnRef idx="1">
-            <a:schemeClr val="accent1"/>
-          </a:lnRef>
-          <a:fillRef idx="0">
-            <a:schemeClr val="accent1"/>
-          </a:fillRef>
-          <a:effectRef idx="0">
-            <a:schemeClr val="accent1"/>
-          </a:effectRef>
-          <a:fontRef idx="minor">
-            <a:schemeClr val="tx1"/>
-          </a:fontRef>
-        </p:style>
-      </p:cxnSp>
-      <p:grpSp>
-        <p:nvGrpSpPr>
-          <p:cNvPr id="181" name="Group 180">
-            <a:extLst>
-              <a:ext uri="{FF2B5EF4-FFF2-40B4-BE49-F238E27FC236}">
-                <a16:creationId xmlns:a16="http://schemas.microsoft.com/office/drawing/2014/main" id="{842C9058-C872-41E4-8DFB-A3A3F3FAC0DF}"/>
-              </a:ext>
-            </a:extLst>
-          </p:cNvPr>
-          <p:cNvGrpSpPr/>
-          <p:nvPr/>
-        </p:nvGrpSpPr>
-        <p:grpSpPr>
-          <a:xfrm>
-            <a:off x="8818449" y="1452315"/>
-            <a:ext cx="1449031" cy="1450988"/>
-            <a:chOff x="2393771" y="946033"/>
-            <a:chExt cx="2341129" cy="2344292"/>
-          </a:xfrm>
-        </p:grpSpPr>
-        <p:sp>
-          <p:nvSpPr>
-            <p:cNvPr id="182" name="Diamond 181">
-              <a:extLst>
-                <a:ext uri="{FF2B5EF4-FFF2-40B4-BE49-F238E27FC236}">
-                  <a16:creationId xmlns:a16="http://schemas.microsoft.com/office/drawing/2014/main" id="{DF483D38-FEE8-46F6-8E53-7A9CE3D1399B}"/>
-                </a:ext>
-              </a:extLst>
-            </p:cNvPr>
-            <p:cNvSpPr/>
-            <p:nvPr/>
-          </p:nvSpPr>
-          <p:spPr>
-            <a:xfrm>
-              <a:off x="3174939" y="1528530"/>
-              <a:ext cx="780372" cy="292640"/>
-            </a:xfrm>
-            <a:prstGeom prst="diamond">
-              <a:avLst/>
-            </a:prstGeom>
-            <a:solidFill>
-              <a:srgbClr val="FF4F4F"/>
-            </a:solidFill>
-            <a:ln w="19050">
-              <a:solidFill>
-                <a:schemeClr val="bg1"/>
-              </a:solidFill>
+              <a:bevel/>
+              <a:headEnd type="oval" w="sm" len="med"/>
+              <a:tailEnd type="oval" w="sm" len="med"/>
             </a:ln>
           </p:spPr>
           <p:style>
-            <a:lnRef idx="2">
-              <a:schemeClr val="accent1">
-                <a:shade val="50000"/>
-              </a:schemeClr>
+            <a:lnRef idx="1">
+              <a:schemeClr val="accent1"/>
             </a:lnRef>
-            <a:fillRef idx="1">
+            <a:fillRef idx="0">
               <a:schemeClr val="accent1"/>
             </a:fillRef>
             <a:effectRef idx="0">
               <a:schemeClr val="accent1"/>
             </a:effectRef>
             <a:fontRef idx="minor">
-              <a:schemeClr val="lt1"/>
+              <a:schemeClr val="tx1"/>
             </a:fontRef>
           </p:style>
-          <p:txBody>
-            <a:bodyPr rtlCol="0" anchor="ctr"/>
-            <a:lstStyle/>
-            <a:p>
-              <a:pPr algn="ctr"/>
-              <a:endParaRPr lang="nl-NL"/>
-            </a:p>
-          </p:txBody>
-        </p:sp>
-        <p:sp>
-          <p:nvSpPr>
-            <p:cNvPr id="183" name="Parallelogram 182">
+        </p:cxnSp>
+        <p:cxnSp>
+          <p:nvCxnSpPr>
+            <p:cNvPr id="173" name="Straight Arrow Connector 172">
               <a:extLst>
                 <a:ext uri="{FF2B5EF4-FFF2-40B4-BE49-F238E27FC236}">
-                  <a16:creationId xmlns:a16="http://schemas.microsoft.com/office/drawing/2014/main" id="{3352E408-F899-47B5-B853-4D52B620117C}"/>
+                  <a16:creationId xmlns:a16="http://schemas.microsoft.com/office/drawing/2014/main" id="{9B07276B-27EC-4298-8BB8-CE39627DE643}"/>
                 </a:ext>
               </a:extLst>
             </p:cNvPr>
-            <p:cNvSpPr/>
+            <p:cNvCxnSpPr>
+              <a:cxnSpLocks/>
+            </p:cNvCxnSpPr>
             <p:nvPr/>
-          </p:nvSpPr>
+          </p:nvCxnSpPr>
           <p:spPr>
-            <a:xfrm rot="5400000">
-              <a:off x="3052222" y="1802267"/>
-              <a:ext cx="634053" cy="390186"/>
+            <a:xfrm flipH="1">
+              <a:off x="9921596" y="2805097"/>
+              <a:ext cx="55032" cy="20085"/>
             </a:xfrm>
-            <a:prstGeom prst="parallelogram">
-              <a:avLst>
-                <a:gd name="adj" fmla="val 37500"/>
-              </a:avLst>
+            <a:prstGeom prst="straightConnector1">
+              <a:avLst/>
             </a:prstGeom>
-            <a:solidFill>
-              <a:srgbClr val="FF4F4F"/>
-            </a:solidFill>
-            <a:ln w="19050">
+            <a:ln w="0" cap="rnd">
               <a:solidFill>
-                <a:schemeClr val="bg1"/>
+                <a:schemeClr val="bg2">
+                  <a:lumMod val="50000"/>
+                </a:schemeClr>
               </a:solidFill>
+              <a:bevel/>
+              <a:headEnd type="none"/>
+              <a:tailEnd type="oval" w="sm" len="med"/>
             </a:ln>
           </p:spPr>
           <p:style>
-            <a:lnRef idx="2">
-              <a:schemeClr val="accent1">
-                <a:shade val="50000"/>
-              </a:schemeClr>
+            <a:lnRef idx="1">
+              <a:schemeClr val="accent1"/>
             </a:lnRef>
-            <a:fillRef idx="1">
+            <a:fillRef idx="0">
               <a:schemeClr val="accent1"/>
             </a:fillRef>
             <a:effectRef idx="0">
               <a:schemeClr val="accent1"/>
             </a:effectRef>
             <a:fontRef idx="minor">
-              <a:schemeClr val="lt1"/>
+              <a:schemeClr val="tx1"/>
             </a:fontRef>
           </p:style>
+        </p:cxnSp>
+        <p:sp>
+          <p:nvSpPr>
+            <p:cNvPr id="174" name="TextBox 173">
+              <a:extLst>
+                <a:ext uri="{FF2B5EF4-FFF2-40B4-BE49-F238E27FC236}">
+                  <a16:creationId xmlns:a16="http://schemas.microsoft.com/office/drawing/2014/main" id="{6D72DC01-6433-4B3A-A6CA-D66787BEC436}"/>
+                </a:ext>
+              </a:extLst>
+            </p:cNvPr>
+            <p:cNvSpPr txBox="1"/>
+            <p:nvPr/>
+          </p:nvSpPr>
+          <p:spPr>
+            <a:xfrm>
+              <a:off x="9140401" y="2876735"/>
+              <a:ext cx="388248" cy="215444"/>
+            </a:xfrm>
+            <a:prstGeom prst="rect">
+              <a:avLst/>
+            </a:prstGeom>
+            <a:noFill/>
+          </p:spPr>
           <p:txBody>
-            <a:bodyPr rtlCol="0" anchor="ctr"/>
+            <a:bodyPr wrap="none" rtlCol="0">
+              <a:spAutoFit/>
+            </a:bodyPr>
             <a:lstStyle/>
             <a:p>
-              <a:pPr algn="ctr"/>
-              <a:endParaRPr lang="nl-NL"/>
+              <a:r>
+                <a:rPr lang="en-GB" sz="800" b="1" dirty="0">
+                  <a:solidFill>
+                    <a:schemeClr val="bg2">
+                      <a:lumMod val="50000"/>
+                    </a:schemeClr>
+                  </a:solidFill>
+                </a:rPr>
+                <a:t>Race</a:t>
+              </a:r>
+              <a:endParaRPr lang="nl-NL" b="1" dirty="0">
+                <a:solidFill>
+                  <a:schemeClr val="bg2">
+                    <a:lumMod val="50000"/>
+                  </a:schemeClr>
+                </a:solidFill>
+              </a:endParaRPr>
             </a:p>
           </p:txBody>
         </p:sp>
         <p:sp>
           <p:nvSpPr>
-            <p:cNvPr id="184" name="Parallelogram 183">
+            <p:cNvPr id="176" name="TextBox 175">
               <a:extLst>
                 <a:ext uri="{FF2B5EF4-FFF2-40B4-BE49-F238E27FC236}">
-                  <a16:creationId xmlns:a16="http://schemas.microsoft.com/office/drawing/2014/main" id="{1C7233F2-AE7F-4B0F-8F40-1A6F7CE36AB6}"/>
+                  <a16:creationId xmlns:a16="http://schemas.microsoft.com/office/drawing/2014/main" id="{5DBB4E6A-B5EC-43B5-ACC8-04E269376404}"/>
                 </a:ext>
               </a:extLst>
             </p:cNvPr>
-            <p:cNvSpPr/>
+            <p:cNvSpPr txBox="1"/>
             <p:nvPr/>
           </p:nvSpPr>
           <p:spPr>
-            <a:xfrm rot="5400000" flipV="1">
-              <a:off x="3442408" y="1802267"/>
-              <a:ext cx="634053" cy="390186"/>
+            <a:xfrm>
+              <a:off x="9548053" y="2909746"/>
+              <a:ext cx="514885" cy="215444"/>
             </a:xfrm>
-            <a:prstGeom prst="parallelogram">
-              <a:avLst>
-                <a:gd name="adj" fmla="val 37500"/>
-              </a:avLst>
+            <a:prstGeom prst="rect">
+              <a:avLst/>
             </a:prstGeom>
-            <a:solidFill>
-              <a:srgbClr val="FF4F4F"/>
-            </a:solidFill>
-            <a:ln w="19050">
+            <a:noFill/>
+          </p:spPr>
+          <p:txBody>
+            <a:bodyPr wrap="none" rtlCol="0">
+              <a:spAutoFit/>
+            </a:bodyPr>
+            <a:lstStyle/>
+            <a:p>
+              <a:r>
+                <a:rPr lang="en-GB" sz="800" b="1" dirty="0">
+                  <a:solidFill>
+                    <a:schemeClr val="bg2">
+                      <a:lumMod val="50000"/>
+                    </a:schemeClr>
+                  </a:solidFill>
+                </a:rPr>
+                <a:t>January</a:t>
+              </a:r>
+              <a:endParaRPr lang="nl-NL" b="1" dirty="0">
+                <a:solidFill>
+                  <a:schemeClr val="bg2">
+                    <a:lumMod val="50000"/>
+                  </a:schemeClr>
+                </a:solidFill>
+              </a:endParaRPr>
+            </a:p>
+          </p:txBody>
+        </p:sp>
+        <p:cxnSp>
+          <p:nvCxnSpPr>
+            <p:cNvPr id="178" name="Straight Arrow Connector 177">
+              <a:extLst>
+                <a:ext uri="{FF2B5EF4-FFF2-40B4-BE49-F238E27FC236}">
+                  <a16:creationId xmlns:a16="http://schemas.microsoft.com/office/drawing/2014/main" id="{0F760C7C-2E25-4302-8A62-C5BDBF119272}"/>
+                </a:ext>
+              </a:extLst>
+            </p:cNvPr>
+            <p:cNvCxnSpPr>
+              <a:cxnSpLocks/>
+            </p:cNvCxnSpPr>
+            <p:nvPr/>
+          </p:nvCxnSpPr>
+          <p:spPr>
+            <a:xfrm>
+              <a:off x="8922834" y="2737729"/>
+              <a:ext cx="250859" cy="92329"/>
+            </a:xfrm>
+            <a:prstGeom prst="straightConnector1">
+              <a:avLst/>
+            </a:prstGeom>
+            <a:ln w="19050" cap="rnd">
               <a:solidFill>
-                <a:schemeClr val="bg1"/>
+                <a:schemeClr val="bg2">
+                  <a:lumMod val="50000"/>
+                </a:schemeClr>
               </a:solidFill>
+              <a:round/>
+              <a:headEnd type="oval" w="sm" len="med"/>
+              <a:tailEnd type="oval" w="sm" len="med"/>
             </a:ln>
           </p:spPr>
           <p:style>
-            <a:lnRef idx="2">
-              <a:schemeClr val="accent1">
-                <a:shade val="50000"/>
-              </a:schemeClr>
+            <a:lnRef idx="1">
+              <a:schemeClr val="accent1"/>
             </a:lnRef>
-            <a:fillRef idx="1">
+            <a:fillRef idx="0">
               <a:schemeClr val="accent1"/>
             </a:fillRef>
             <a:effectRef idx="0">
               <a:schemeClr val="accent1"/>
             </a:effectRef>
             <a:fontRef idx="minor">
-              <a:schemeClr val="lt1"/>
+              <a:schemeClr val="tx1"/>
             </a:fontRef>
           </p:style>
-          <p:txBody>
-            <a:bodyPr rtlCol="0" anchor="ctr"/>
-            <a:lstStyle/>
-            <a:p>
-              <a:pPr algn="ctr"/>
-              <a:endParaRPr lang="nl-NL"/>
-            </a:p>
-          </p:txBody>
-        </p:sp>
-        <p:sp>
-          <p:nvSpPr>
-            <p:cNvPr id="185" name="Parallelogram 184">
+        </p:cxnSp>
+        <p:cxnSp>
+          <p:nvCxnSpPr>
+            <p:cNvPr id="179" name="Straight Arrow Connector 178">
               <a:extLst>
                 <a:ext uri="{FF2B5EF4-FFF2-40B4-BE49-F238E27FC236}">
-                  <a16:creationId xmlns:a16="http://schemas.microsoft.com/office/drawing/2014/main" id="{AC29E230-8329-4A63-B692-2880354A4631}"/>
+                  <a16:creationId xmlns:a16="http://schemas.microsoft.com/office/drawing/2014/main" id="{9384F56E-3A25-4BC4-8082-68B044DEB6F1}"/>
                 </a:ext>
               </a:extLst>
             </p:cNvPr>
-            <p:cNvSpPr/>
+            <p:cNvCxnSpPr>
+              <a:cxnSpLocks/>
+            </p:cNvCxnSpPr>
             <p:nvPr/>
-          </p:nvSpPr>
+          </p:nvCxnSpPr>
           <p:spPr>
-            <a:xfrm rot="5400000" flipV="1">
-              <a:off x="3442408" y="2290474"/>
-              <a:ext cx="634053" cy="390186"/>
+            <a:xfrm>
+              <a:off x="9157268" y="2822935"/>
+              <a:ext cx="241635" cy="90668"/>
             </a:xfrm>
-            <a:prstGeom prst="parallelogram">
-              <a:avLst>
-                <a:gd name="adj" fmla="val 37500"/>
-              </a:avLst>
+            <a:prstGeom prst="straightConnector1">
+              <a:avLst/>
             </a:prstGeom>
-            <a:solidFill>
-              <a:srgbClr val="FF4F4F"/>
-            </a:solidFill>
-            <a:ln w="19050">
+            <a:ln w="19050" cap="rnd">
               <a:solidFill>
-                <a:schemeClr val="bg1"/>
+                <a:schemeClr val="bg2">
+                  <a:lumMod val="50000"/>
+                </a:schemeClr>
               </a:solidFill>
+              <a:round/>
+              <a:headEnd type="none"/>
+              <a:tailEnd type="oval" w="sm" len="med"/>
             </a:ln>
           </p:spPr>
           <p:style>
-            <a:lnRef idx="2">
-              <a:schemeClr val="accent1">
-                <a:shade val="50000"/>
-              </a:schemeClr>
+            <a:lnRef idx="1">
+              <a:schemeClr val="accent1"/>
             </a:lnRef>
-            <a:fillRef idx="1">
+            <a:fillRef idx="0">
               <a:schemeClr val="accent1"/>
             </a:fillRef>
             <a:effectRef idx="0">
               <a:schemeClr val="accent1"/>
             </a:effectRef>
             <a:fontRef idx="minor">
-              <a:schemeClr val="lt1"/>
+              <a:schemeClr val="tx1"/>
             </a:fontRef>
           </p:style>
+        </p:cxnSp>
+        <p:grpSp>
+          <p:nvGrpSpPr>
+            <p:cNvPr id="181" name="Group 180">
+              <a:extLst>
+                <a:ext uri="{FF2B5EF4-FFF2-40B4-BE49-F238E27FC236}">
+                  <a16:creationId xmlns:a16="http://schemas.microsoft.com/office/drawing/2014/main" id="{842C9058-C872-41E4-8DFB-A3A3F3FAC0DF}"/>
+                </a:ext>
+              </a:extLst>
+            </p:cNvPr>
+            <p:cNvGrpSpPr/>
+            <p:nvPr/>
+          </p:nvGrpSpPr>
+          <p:grpSpPr>
+            <a:xfrm>
+              <a:off x="8818449" y="1452315"/>
+              <a:ext cx="1449031" cy="1450988"/>
+              <a:chOff x="2393771" y="946033"/>
+              <a:chExt cx="2341129" cy="2344292"/>
+            </a:xfrm>
+          </p:grpSpPr>
+          <p:sp>
+            <p:nvSpPr>
+              <p:cNvPr id="182" name="Diamond 181">
+                <a:extLst>
+                  <a:ext uri="{FF2B5EF4-FFF2-40B4-BE49-F238E27FC236}">
+                    <a16:creationId xmlns:a16="http://schemas.microsoft.com/office/drawing/2014/main" id="{DF483D38-FEE8-46F6-8E53-7A9CE3D1399B}"/>
+                  </a:ext>
+                </a:extLst>
+              </p:cNvPr>
+              <p:cNvSpPr/>
+              <p:nvPr/>
+            </p:nvSpPr>
+            <p:spPr>
+              <a:xfrm>
+                <a:off x="3174939" y="1528530"/>
+                <a:ext cx="780372" cy="292640"/>
+              </a:xfrm>
+              <a:prstGeom prst="diamond">
+                <a:avLst/>
+              </a:prstGeom>
+              <a:solidFill>
+                <a:srgbClr val="FF4F4F"/>
+              </a:solidFill>
+              <a:ln w="19050">
+                <a:solidFill>
+                  <a:schemeClr val="bg1"/>
+                </a:solidFill>
+              </a:ln>
+            </p:spPr>
+            <p:style>
+              <a:lnRef idx="2">
+                <a:schemeClr val="accent1">
+                  <a:shade val="50000"/>
+                </a:schemeClr>
+              </a:lnRef>
+              <a:fillRef idx="1">
+                <a:schemeClr val="accent1"/>
+              </a:fillRef>
+              <a:effectRef idx="0">
+                <a:schemeClr val="accent1"/>
+              </a:effectRef>
+              <a:fontRef idx="minor">
+                <a:schemeClr val="lt1"/>
+              </a:fontRef>
+            </p:style>
+            <p:txBody>
+              <a:bodyPr rtlCol="0" anchor="ctr"/>
+              <a:lstStyle/>
+              <a:p>
+                <a:pPr algn="ctr"/>
+                <a:endParaRPr lang="nl-NL"/>
+              </a:p>
+            </p:txBody>
+          </p:sp>
+          <p:sp>
+            <p:nvSpPr>
+              <p:cNvPr id="183" name="Parallelogram 182">
+                <a:extLst>
+                  <a:ext uri="{FF2B5EF4-FFF2-40B4-BE49-F238E27FC236}">
+                    <a16:creationId xmlns:a16="http://schemas.microsoft.com/office/drawing/2014/main" id="{3352E408-F899-47B5-B853-4D52B620117C}"/>
+                  </a:ext>
+                </a:extLst>
+              </p:cNvPr>
+              <p:cNvSpPr/>
+              <p:nvPr/>
+            </p:nvSpPr>
+            <p:spPr>
+              <a:xfrm rot="5400000">
+                <a:off x="3052222" y="1802267"/>
+                <a:ext cx="634053" cy="390186"/>
+              </a:xfrm>
+              <a:prstGeom prst="parallelogram">
+                <a:avLst>
+                  <a:gd name="adj" fmla="val 37500"/>
+                </a:avLst>
+              </a:prstGeom>
+              <a:solidFill>
+                <a:srgbClr val="FF4F4F"/>
+              </a:solidFill>
+              <a:ln w="19050">
+                <a:solidFill>
+                  <a:schemeClr val="bg1"/>
+                </a:solidFill>
+              </a:ln>
+            </p:spPr>
+            <p:style>
+              <a:lnRef idx="2">
+                <a:schemeClr val="accent1">
+                  <a:shade val="50000"/>
+                </a:schemeClr>
+              </a:lnRef>
+              <a:fillRef idx="1">
+                <a:schemeClr val="accent1"/>
+              </a:fillRef>
+              <a:effectRef idx="0">
+                <a:schemeClr val="accent1"/>
+              </a:effectRef>
+              <a:fontRef idx="minor">
+                <a:schemeClr val="lt1"/>
+              </a:fontRef>
+            </p:style>
+            <p:txBody>
+              <a:bodyPr rtlCol="0" anchor="ctr"/>
+              <a:lstStyle/>
+              <a:p>
+                <a:pPr algn="ctr"/>
+                <a:endParaRPr lang="nl-NL"/>
+              </a:p>
+            </p:txBody>
+          </p:sp>
+          <p:sp>
+            <p:nvSpPr>
+              <p:cNvPr id="184" name="Parallelogram 183">
+                <a:extLst>
+                  <a:ext uri="{FF2B5EF4-FFF2-40B4-BE49-F238E27FC236}">
+                    <a16:creationId xmlns:a16="http://schemas.microsoft.com/office/drawing/2014/main" id="{1C7233F2-AE7F-4B0F-8F40-1A6F7CE36AB6}"/>
+                  </a:ext>
+                </a:extLst>
+              </p:cNvPr>
+              <p:cNvSpPr/>
+              <p:nvPr/>
+            </p:nvSpPr>
+            <p:spPr>
+              <a:xfrm rot="5400000" flipV="1">
+                <a:off x="3442408" y="1802267"/>
+                <a:ext cx="634053" cy="390186"/>
+              </a:xfrm>
+              <a:prstGeom prst="parallelogram">
+                <a:avLst>
+                  <a:gd name="adj" fmla="val 37500"/>
+                </a:avLst>
+              </a:prstGeom>
+              <a:solidFill>
+                <a:srgbClr val="FF4F4F"/>
+              </a:solidFill>
+              <a:ln w="19050">
+                <a:solidFill>
+                  <a:schemeClr val="bg1"/>
+                </a:solidFill>
+              </a:ln>
+            </p:spPr>
+            <p:style>
+              <a:lnRef idx="2">
+                <a:schemeClr val="accent1">
+                  <a:shade val="50000"/>
+                </a:schemeClr>
+              </a:lnRef>
+              <a:fillRef idx="1">
+                <a:schemeClr val="accent1"/>
+              </a:fillRef>
+              <a:effectRef idx="0">
+                <a:schemeClr val="accent1"/>
+              </a:effectRef>
+              <a:fontRef idx="minor">
+                <a:schemeClr val="lt1"/>
+              </a:fontRef>
+            </p:style>
+            <p:txBody>
+              <a:bodyPr rtlCol="0" anchor="ctr"/>
+              <a:lstStyle/>
+              <a:p>
+                <a:pPr algn="ctr"/>
+                <a:endParaRPr lang="nl-NL" dirty="0"/>
+              </a:p>
+            </p:txBody>
+          </p:sp>
+          <p:sp>
+            <p:nvSpPr>
+              <p:cNvPr id="185" name="Parallelogram 184">
+                <a:extLst>
+                  <a:ext uri="{FF2B5EF4-FFF2-40B4-BE49-F238E27FC236}">
+                    <a16:creationId xmlns:a16="http://schemas.microsoft.com/office/drawing/2014/main" id="{AC29E230-8329-4A63-B692-2880354A4631}"/>
+                  </a:ext>
+                </a:extLst>
+              </p:cNvPr>
+              <p:cNvSpPr/>
+              <p:nvPr/>
+            </p:nvSpPr>
+            <p:spPr>
+              <a:xfrm rot="5400000" flipV="1">
+                <a:off x="3442408" y="2290474"/>
+                <a:ext cx="634053" cy="390186"/>
+              </a:xfrm>
+              <a:prstGeom prst="parallelogram">
+                <a:avLst>
+                  <a:gd name="adj" fmla="val 37500"/>
+                </a:avLst>
+              </a:prstGeom>
+              <a:solidFill>
+                <a:srgbClr val="FF4F4F"/>
+              </a:solidFill>
+              <a:ln w="19050">
+                <a:solidFill>
+                  <a:schemeClr val="bg1"/>
+                </a:solidFill>
+              </a:ln>
+            </p:spPr>
+            <p:style>
+              <a:lnRef idx="2">
+                <a:schemeClr val="accent1">
+                  <a:shade val="50000"/>
+                </a:schemeClr>
+              </a:lnRef>
+              <a:fillRef idx="1">
+                <a:schemeClr val="accent1"/>
+              </a:fillRef>
+              <a:effectRef idx="0">
+                <a:schemeClr val="accent1"/>
+              </a:effectRef>
+              <a:fontRef idx="minor">
+                <a:schemeClr val="lt1"/>
+              </a:fontRef>
+            </p:style>
+            <p:txBody>
+              <a:bodyPr rtlCol="0" anchor="ctr"/>
+              <a:lstStyle/>
+              <a:p>
+                <a:pPr algn="ctr"/>
+                <a:endParaRPr lang="nl-NL"/>
+              </a:p>
+            </p:txBody>
+          </p:sp>
+          <p:sp>
+            <p:nvSpPr>
+              <p:cNvPr id="186" name="Parallelogram 185">
+                <a:extLst>
+                  <a:ext uri="{FF2B5EF4-FFF2-40B4-BE49-F238E27FC236}">
+                    <a16:creationId xmlns:a16="http://schemas.microsoft.com/office/drawing/2014/main" id="{7E22B997-BB54-4DC6-8784-2BA3EA04006E}"/>
+                  </a:ext>
+                </a:extLst>
+              </p:cNvPr>
+              <p:cNvSpPr/>
+              <p:nvPr/>
+            </p:nvSpPr>
+            <p:spPr>
+              <a:xfrm rot="5400000" flipV="1">
+                <a:off x="3442408" y="2778206"/>
+                <a:ext cx="634053" cy="390186"/>
+              </a:xfrm>
+              <a:prstGeom prst="parallelogram">
+                <a:avLst>
+                  <a:gd name="adj" fmla="val 37500"/>
+                </a:avLst>
+              </a:prstGeom>
+              <a:solidFill>
+                <a:srgbClr val="FF4F4F"/>
+              </a:solidFill>
+              <a:ln w="19050">
+                <a:solidFill>
+                  <a:schemeClr val="bg1"/>
+                </a:solidFill>
+              </a:ln>
+            </p:spPr>
+            <p:style>
+              <a:lnRef idx="2">
+                <a:schemeClr val="accent1">
+                  <a:shade val="50000"/>
+                </a:schemeClr>
+              </a:lnRef>
+              <a:fillRef idx="1">
+                <a:schemeClr val="accent1"/>
+              </a:fillRef>
+              <a:effectRef idx="0">
+                <a:schemeClr val="accent1"/>
+              </a:effectRef>
+              <a:fontRef idx="minor">
+                <a:schemeClr val="lt1"/>
+              </a:fontRef>
+            </p:style>
+            <p:txBody>
+              <a:bodyPr rtlCol="0" anchor="ctr"/>
+              <a:lstStyle/>
+              <a:p>
+                <a:pPr algn="ctr"/>
+                <a:endParaRPr lang="nl-NL"/>
+              </a:p>
+            </p:txBody>
+          </p:sp>
+          <p:sp>
+            <p:nvSpPr>
+              <p:cNvPr id="187" name="Parallelogram 186">
+                <a:extLst>
+                  <a:ext uri="{FF2B5EF4-FFF2-40B4-BE49-F238E27FC236}">
+                    <a16:creationId xmlns:a16="http://schemas.microsoft.com/office/drawing/2014/main" id="{7940A30B-9B5C-4769-8B73-755578DD59F3}"/>
+                  </a:ext>
+                </a:extLst>
+              </p:cNvPr>
+              <p:cNvSpPr/>
+              <p:nvPr/>
+            </p:nvSpPr>
+            <p:spPr>
+              <a:xfrm rot="5400000">
+                <a:off x="3052221" y="2290000"/>
+                <a:ext cx="634053" cy="390186"/>
+              </a:xfrm>
+              <a:prstGeom prst="parallelogram">
+                <a:avLst>
+                  <a:gd name="adj" fmla="val 37500"/>
+                </a:avLst>
+              </a:prstGeom>
+              <a:solidFill>
+                <a:srgbClr val="FF4F4F"/>
+              </a:solidFill>
+              <a:ln w="19050">
+                <a:solidFill>
+                  <a:schemeClr val="bg1"/>
+                </a:solidFill>
+              </a:ln>
+            </p:spPr>
+            <p:style>
+              <a:lnRef idx="2">
+                <a:schemeClr val="accent1">
+                  <a:shade val="50000"/>
+                </a:schemeClr>
+              </a:lnRef>
+              <a:fillRef idx="1">
+                <a:schemeClr val="accent1"/>
+              </a:fillRef>
+              <a:effectRef idx="0">
+                <a:schemeClr val="accent1"/>
+              </a:effectRef>
+              <a:fontRef idx="minor">
+                <a:schemeClr val="lt1"/>
+              </a:fontRef>
+            </p:style>
+            <p:txBody>
+              <a:bodyPr rtlCol="0" anchor="ctr"/>
+              <a:lstStyle/>
+              <a:p>
+                <a:pPr algn="ctr"/>
+                <a:endParaRPr lang="nl-NL"/>
+              </a:p>
+            </p:txBody>
+          </p:sp>
+          <p:sp>
+            <p:nvSpPr>
+              <p:cNvPr id="188" name="Parallelogram 187">
+                <a:extLst>
+                  <a:ext uri="{FF2B5EF4-FFF2-40B4-BE49-F238E27FC236}">
+                    <a16:creationId xmlns:a16="http://schemas.microsoft.com/office/drawing/2014/main" id="{3A3A5337-41DF-4F29-8620-36F3B0BCAE41}"/>
+                  </a:ext>
+                </a:extLst>
+              </p:cNvPr>
+              <p:cNvSpPr/>
+              <p:nvPr/>
+            </p:nvSpPr>
+            <p:spPr>
+              <a:xfrm rot="5400000">
+                <a:off x="3052220" y="2778206"/>
+                <a:ext cx="634053" cy="390186"/>
+              </a:xfrm>
+              <a:prstGeom prst="parallelogram">
+                <a:avLst>
+                  <a:gd name="adj" fmla="val 37500"/>
+                </a:avLst>
+              </a:prstGeom>
+              <a:solidFill>
+                <a:srgbClr val="FF4F4F"/>
+              </a:solidFill>
+              <a:ln w="19050">
+                <a:solidFill>
+                  <a:schemeClr val="bg1"/>
+                </a:solidFill>
+              </a:ln>
+            </p:spPr>
+            <p:style>
+              <a:lnRef idx="2">
+                <a:schemeClr val="accent1">
+                  <a:shade val="50000"/>
+                </a:schemeClr>
+              </a:lnRef>
+              <a:fillRef idx="1">
+                <a:schemeClr val="accent1"/>
+              </a:fillRef>
+              <a:effectRef idx="0">
+                <a:schemeClr val="accent1"/>
+              </a:effectRef>
+              <a:fontRef idx="minor">
+                <a:schemeClr val="lt1"/>
+              </a:fontRef>
+            </p:style>
+            <p:txBody>
+              <a:bodyPr rtlCol="0" anchor="ctr"/>
+              <a:lstStyle/>
+              <a:p>
+                <a:pPr algn="ctr"/>
+                <a:endParaRPr lang="nl-NL"/>
+              </a:p>
+            </p:txBody>
+          </p:sp>
+          <p:sp>
+            <p:nvSpPr>
+              <p:cNvPr id="189" name="Parallelogram 188">
+                <a:extLst>
+                  <a:ext uri="{FF2B5EF4-FFF2-40B4-BE49-F238E27FC236}">
+                    <a16:creationId xmlns:a16="http://schemas.microsoft.com/office/drawing/2014/main" id="{587E7F14-74AE-4841-BB6E-5EE7AC139FCE}"/>
+                  </a:ext>
+                </a:extLst>
+              </p:cNvPr>
+              <p:cNvSpPr/>
+              <p:nvPr/>
+            </p:nvSpPr>
+            <p:spPr>
+              <a:xfrm rot="5400000">
+                <a:off x="2662032" y="1655947"/>
+                <a:ext cx="634053" cy="390186"/>
+              </a:xfrm>
+              <a:prstGeom prst="parallelogram">
+                <a:avLst>
+                  <a:gd name="adj" fmla="val 37500"/>
+                </a:avLst>
+              </a:prstGeom>
+              <a:solidFill>
+                <a:srgbClr val="FF4F4F"/>
+              </a:solidFill>
+              <a:ln w="19050">
+                <a:solidFill>
+                  <a:schemeClr val="bg1"/>
+                </a:solidFill>
+              </a:ln>
+            </p:spPr>
+            <p:style>
+              <a:lnRef idx="2">
+                <a:schemeClr val="accent1">
+                  <a:shade val="50000"/>
+                </a:schemeClr>
+              </a:lnRef>
+              <a:fillRef idx="1">
+                <a:schemeClr val="accent1"/>
+              </a:fillRef>
+              <a:effectRef idx="0">
+                <a:schemeClr val="accent1"/>
+              </a:effectRef>
+              <a:fontRef idx="minor">
+                <a:schemeClr val="lt1"/>
+              </a:fontRef>
+            </p:style>
+            <p:txBody>
+              <a:bodyPr rtlCol="0" anchor="ctr"/>
+              <a:lstStyle/>
+              <a:p>
+                <a:pPr algn="ctr"/>
+                <a:endParaRPr lang="nl-NL"/>
+              </a:p>
+            </p:txBody>
+          </p:sp>
+          <p:sp>
+            <p:nvSpPr>
+              <p:cNvPr id="190" name="Parallelogram 189">
+                <a:extLst>
+                  <a:ext uri="{FF2B5EF4-FFF2-40B4-BE49-F238E27FC236}">
+                    <a16:creationId xmlns:a16="http://schemas.microsoft.com/office/drawing/2014/main" id="{5AF1AFBD-8AE0-4D1A-B508-C912DEE0BE40}"/>
+                  </a:ext>
+                </a:extLst>
+              </p:cNvPr>
+              <p:cNvSpPr/>
+              <p:nvPr/>
+            </p:nvSpPr>
+            <p:spPr>
+              <a:xfrm rot="5400000">
+                <a:off x="2662031" y="2143679"/>
+                <a:ext cx="634053" cy="390186"/>
+              </a:xfrm>
+              <a:prstGeom prst="parallelogram">
+                <a:avLst>
+                  <a:gd name="adj" fmla="val 37500"/>
+                </a:avLst>
+              </a:prstGeom>
+              <a:solidFill>
+                <a:srgbClr val="FF4F4F"/>
+              </a:solidFill>
+              <a:ln w="19050">
+                <a:solidFill>
+                  <a:schemeClr val="bg1"/>
+                </a:solidFill>
+              </a:ln>
+            </p:spPr>
+            <p:style>
+              <a:lnRef idx="2">
+                <a:schemeClr val="accent1">
+                  <a:shade val="50000"/>
+                </a:schemeClr>
+              </a:lnRef>
+              <a:fillRef idx="1">
+                <a:schemeClr val="accent1"/>
+              </a:fillRef>
+              <a:effectRef idx="0">
+                <a:schemeClr val="accent1"/>
+              </a:effectRef>
+              <a:fontRef idx="minor">
+                <a:schemeClr val="lt1"/>
+              </a:fontRef>
+            </p:style>
+            <p:txBody>
+              <a:bodyPr rtlCol="0" anchor="ctr"/>
+              <a:lstStyle/>
+              <a:p>
+                <a:pPr algn="ctr"/>
+                <a:endParaRPr lang="nl-NL"/>
+              </a:p>
+            </p:txBody>
+          </p:sp>
+          <p:sp>
+            <p:nvSpPr>
+              <p:cNvPr id="191" name="Parallelogram 190">
+                <a:extLst>
+                  <a:ext uri="{FF2B5EF4-FFF2-40B4-BE49-F238E27FC236}">
+                    <a16:creationId xmlns:a16="http://schemas.microsoft.com/office/drawing/2014/main" id="{90A6B61F-90EF-4DB4-AA1F-BD5FD628C8A6}"/>
+                  </a:ext>
+                </a:extLst>
+              </p:cNvPr>
+              <p:cNvSpPr/>
+              <p:nvPr/>
+            </p:nvSpPr>
+            <p:spPr>
+              <a:xfrm rot="5400000">
+                <a:off x="2662030" y="2631886"/>
+                <a:ext cx="634053" cy="390186"/>
+              </a:xfrm>
+              <a:prstGeom prst="parallelogram">
+                <a:avLst>
+                  <a:gd name="adj" fmla="val 37500"/>
+                </a:avLst>
+              </a:prstGeom>
+              <a:solidFill>
+                <a:srgbClr val="FF4F4F"/>
+              </a:solidFill>
+              <a:ln w="19050">
+                <a:solidFill>
+                  <a:schemeClr val="bg1"/>
+                </a:solidFill>
+              </a:ln>
+            </p:spPr>
+            <p:style>
+              <a:lnRef idx="2">
+                <a:schemeClr val="accent1">
+                  <a:shade val="50000"/>
+                </a:schemeClr>
+              </a:lnRef>
+              <a:fillRef idx="1">
+                <a:schemeClr val="accent1"/>
+              </a:fillRef>
+              <a:effectRef idx="0">
+                <a:schemeClr val="accent1"/>
+              </a:effectRef>
+              <a:fontRef idx="minor">
+                <a:schemeClr val="lt1"/>
+              </a:fontRef>
+            </p:style>
+            <p:txBody>
+              <a:bodyPr rtlCol="0" anchor="ctr"/>
+              <a:lstStyle/>
+              <a:p>
+                <a:pPr algn="ctr"/>
+                <a:endParaRPr lang="nl-NL"/>
+              </a:p>
+            </p:txBody>
+          </p:sp>
+          <p:sp>
+            <p:nvSpPr>
+              <p:cNvPr id="192" name="Parallelogram 191">
+                <a:extLst>
+                  <a:ext uri="{FF2B5EF4-FFF2-40B4-BE49-F238E27FC236}">
+                    <a16:creationId xmlns:a16="http://schemas.microsoft.com/office/drawing/2014/main" id="{7C3BF5F5-2019-4B56-BD85-BB3B698F7A58}"/>
+                  </a:ext>
+                </a:extLst>
+              </p:cNvPr>
+              <p:cNvSpPr/>
+              <p:nvPr/>
+            </p:nvSpPr>
+            <p:spPr>
+              <a:xfrm rot="5400000">
+                <a:off x="2271839" y="1510101"/>
+                <a:ext cx="634053" cy="390186"/>
+              </a:xfrm>
+              <a:prstGeom prst="parallelogram">
+                <a:avLst>
+                  <a:gd name="adj" fmla="val 37500"/>
+                </a:avLst>
+              </a:prstGeom>
+              <a:solidFill>
+                <a:srgbClr val="FF4F4F"/>
+              </a:solidFill>
+              <a:ln w="19050">
+                <a:solidFill>
+                  <a:schemeClr val="bg1"/>
+                </a:solidFill>
+              </a:ln>
+            </p:spPr>
+            <p:style>
+              <a:lnRef idx="2">
+                <a:schemeClr val="accent1">
+                  <a:shade val="50000"/>
+                </a:schemeClr>
+              </a:lnRef>
+              <a:fillRef idx="1">
+                <a:schemeClr val="accent1"/>
+              </a:fillRef>
+              <a:effectRef idx="0">
+                <a:schemeClr val="accent1"/>
+              </a:effectRef>
+              <a:fontRef idx="minor">
+                <a:schemeClr val="lt1"/>
+              </a:fontRef>
+            </p:style>
+            <p:txBody>
+              <a:bodyPr rtlCol="0" anchor="ctr"/>
+              <a:lstStyle/>
+              <a:p>
+                <a:pPr algn="ctr"/>
+                <a:endParaRPr lang="nl-NL"/>
+              </a:p>
+            </p:txBody>
+          </p:sp>
+          <p:sp>
+            <p:nvSpPr>
+              <p:cNvPr id="193" name="Parallelogram 192">
+                <a:extLst>
+                  <a:ext uri="{FF2B5EF4-FFF2-40B4-BE49-F238E27FC236}">
+                    <a16:creationId xmlns:a16="http://schemas.microsoft.com/office/drawing/2014/main" id="{02875EBC-B89B-4EA8-849E-0FCFA3ED263F}"/>
+                  </a:ext>
+                </a:extLst>
+              </p:cNvPr>
+              <p:cNvSpPr/>
+              <p:nvPr/>
+            </p:nvSpPr>
+            <p:spPr>
+              <a:xfrm rot="5400000">
+                <a:off x="2271838" y="1997834"/>
+                <a:ext cx="634053" cy="390186"/>
+              </a:xfrm>
+              <a:prstGeom prst="parallelogram">
+                <a:avLst>
+                  <a:gd name="adj" fmla="val 37500"/>
+                </a:avLst>
+              </a:prstGeom>
+              <a:solidFill>
+                <a:srgbClr val="FF4F4F"/>
+              </a:solidFill>
+              <a:ln w="19050">
+                <a:solidFill>
+                  <a:schemeClr val="bg1"/>
+                </a:solidFill>
+              </a:ln>
+            </p:spPr>
+            <p:style>
+              <a:lnRef idx="2">
+                <a:schemeClr val="accent1">
+                  <a:shade val="50000"/>
+                </a:schemeClr>
+              </a:lnRef>
+              <a:fillRef idx="1">
+                <a:schemeClr val="accent1"/>
+              </a:fillRef>
+              <a:effectRef idx="0">
+                <a:schemeClr val="accent1"/>
+              </a:effectRef>
+              <a:fontRef idx="minor">
+                <a:schemeClr val="lt1"/>
+              </a:fontRef>
+            </p:style>
+            <p:txBody>
+              <a:bodyPr rtlCol="0" anchor="ctr"/>
+              <a:lstStyle/>
+              <a:p>
+                <a:pPr algn="ctr"/>
+                <a:endParaRPr lang="nl-NL"/>
+              </a:p>
+            </p:txBody>
+          </p:sp>
+          <p:sp>
+            <p:nvSpPr>
+              <p:cNvPr id="194" name="Parallelogram 193">
+                <a:extLst>
+                  <a:ext uri="{FF2B5EF4-FFF2-40B4-BE49-F238E27FC236}">
+                    <a16:creationId xmlns:a16="http://schemas.microsoft.com/office/drawing/2014/main" id="{DCFEAC24-C399-486A-98B6-1F553AE45F54}"/>
+                  </a:ext>
+                </a:extLst>
+              </p:cNvPr>
+              <p:cNvSpPr/>
+              <p:nvPr/>
+            </p:nvSpPr>
+            <p:spPr>
+              <a:xfrm rot="5400000">
+                <a:off x="2271837" y="2486041"/>
+                <a:ext cx="634053" cy="390186"/>
+              </a:xfrm>
+              <a:prstGeom prst="parallelogram">
+                <a:avLst>
+                  <a:gd name="adj" fmla="val 37500"/>
+                </a:avLst>
+              </a:prstGeom>
+              <a:solidFill>
+                <a:srgbClr val="FF4F4F"/>
+              </a:solidFill>
+              <a:ln w="19050">
+                <a:solidFill>
+                  <a:schemeClr val="bg1"/>
+                </a:solidFill>
+              </a:ln>
+            </p:spPr>
+            <p:style>
+              <a:lnRef idx="2">
+                <a:schemeClr val="accent1">
+                  <a:shade val="50000"/>
+                </a:schemeClr>
+              </a:lnRef>
+              <a:fillRef idx="1">
+                <a:schemeClr val="accent1"/>
+              </a:fillRef>
+              <a:effectRef idx="0">
+                <a:schemeClr val="accent1"/>
+              </a:effectRef>
+              <a:fontRef idx="minor">
+                <a:schemeClr val="lt1"/>
+              </a:fontRef>
+            </p:style>
+            <p:txBody>
+              <a:bodyPr rtlCol="0" anchor="ctr"/>
+              <a:lstStyle/>
+              <a:p>
+                <a:pPr algn="ctr"/>
+                <a:endParaRPr lang="nl-NL"/>
+              </a:p>
+            </p:txBody>
+          </p:sp>
+          <p:sp>
+            <p:nvSpPr>
+              <p:cNvPr id="195" name="Diamond 194">
+                <a:extLst>
+                  <a:ext uri="{FF2B5EF4-FFF2-40B4-BE49-F238E27FC236}">
+                    <a16:creationId xmlns:a16="http://schemas.microsoft.com/office/drawing/2014/main" id="{D096D9D9-D9B6-4838-A6E4-08FEA8E11420}"/>
+                  </a:ext>
+                </a:extLst>
+              </p:cNvPr>
+              <p:cNvSpPr/>
+              <p:nvPr/>
+            </p:nvSpPr>
+            <p:spPr>
+              <a:xfrm>
+                <a:off x="2789440" y="1383612"/>
+                <a:ext cx="780372" cy="292640"/>
+              </a:xfrm>
+              <a:prstGeom prst="diamond">
+                <a:avLst/>
+              </a:prstGeom>
+              <a:solidFill>
+                <a:srgbClr val="FF4F4F"/>
+              </a:solidFill>
+              <a:ln w="19050">
+                <a:solidFill>
+                  <a:schemeClr val="bg1"/>
+                </a:solidFill>
+              </a:ln>
+            </p:spPr>
+            <p:style>
+              <a:lnRef idx="2">
+                <a:schemeClr val="accent1">
+                  <a:shade val="50000"/>
+                </a:schemeClr>
+              </a:lnRef>
+              <a:fillRef idx="1">
+                <a:schemeClr val="accent1"/>
+              </a:fillRef>
+              <a:effectRef idx="0">
+                <a:schemeClr val="accent1"/>
+              </a:effectRef>
+              <a:fontRef idx="minor">
+                <a:schemeClr val="lt1"/>
+              </a:fontRef>
+            </p:style>
+            <p:txBody>
+              <a:bodyPr rtlCol="0" anchor="ctr"/>
+              <a:lstStyle/>
+              <a:p>
+                <a:pPr algn="ctr"/>
+                <a:endParaRPr lang="nl-NL"/>
+              </a:p>
+            </p:txBody>
+          </p:sp>
+          <p:sp>
+            <p:nvSpPr>
+              <p:cNvPr id="196" name="Diamond 195">
+                <a:extLst>
+                  <a:ext uri="{FF2B5EF4-FFF2-40B4-BE49-F238E27FC236}">
+                    <a16:creationId xmlns:a16="http://schemas.microsoft.com/office/drawing/2014/main" id="{68FE2C22-9D0F-419A-B384-CD365DB17224}"/>
+                  </a:ext>
+                </a:extLst>
+              </p:cNvPr>
+              <p:cNvSpPr/>
+              <p:nvPr/>
+            </p:nvSpPr>
+            <p:spPr>
+              <a:xfrm>
+                <a:off x="2400027" y="1237911"/>
+                <a:ext cx="780372" cy="292640"/>
+              </a:xfrm>
+              <a:prstGeom prst="diamond">
+                <a:avLst/>
+              </a:prstGeom>
+              <a:solidFill>
+                <a:srgbClr val="FF4F4F"/>
+              </a:solidFill>
+              <a:ln w="19050">
+                <a:solidFill>
+                  <a:schemeClr val="bg1"/>
+                </a:solidFill>
+              </a:ln>
+            </p:spPr>
+            <p:style>
+              <a:lnRef idx="2">
+                <a:schemeClr val="accent1">
+                  <a:shade val="50000"/>
+                </a:schemeClr>
+              </a:lnRef>
+              <a:fillRef idx="1">
+                <a:schemeClr val="accent1"/>
+              </a:fillRef>
+              <a:effectRef idx="0">
+                <a:schemeClr val="accent1"/>
+              </a:effectRef>
+              <a:fontRef idx="minor">
+                <a:schemeClr val="lt1"/>
+              </a:fontRef>
+            </p:style>
+            <p:txBody>
+              <a:bodyPr rtlCol="0" anchor="ctr"/>
+              <a:lstStyle/>
+              <a:p>
+                <a:pPr algn="ctr"/>
+                <a:endParaRPr lang="nl-NL"/>
+              </a:p>
+            </p:txBody>
+          </p:sp>
+          <p:sp>
+            <p:nvSpPr>
+              <p:cNvPr id="197" name="Parallelogram 196">
+                <a:extLst>
+                  <a:ext uri="{FF2B5EF4-FFF2-40B4-BE49-F238E27FC236}">
+                    <a16:creationId xmlns:a16="http://schemas.microsoft.com/office/drawing/2014/main" id="{18C35CA5-FEC2-407C-B049-3B4A75781775}"/>
+                  </a:ext>
+                </a:extLst>
+              </p:cNvPr>
+              <p:cNvSpPr/>
+              <p:nvPr/>
+            </p:nvSpPr>
+            <p:spPr>
+              <a:xfrm rot="5400000" flipV="1">
+                <a:off x="3832594" y="1655947"/>
+                <a:ext cx="634053" cy="390186"/>
+              </a:xfrm>
+              <a:prstGeom prst="parallelogram">
+                <a:avLst>
+                  <a:gd name="adj" fmla="val 37500"/>
+                </a:avLst>
+              </a:prstGeom>
+              <a:solidFill>
+                <a:srgbClr val="FF4F4F"/>
+              </a:solidFill>
+              <a:ln w="19050">
+                <a:solidFill>
+                  <a:schemeClr val="bg1"/>
+                </a:solidFill>
+              </a:ln>
+            </p:spPr>
+            <p:style>
+              <a:lnRef idx="2">
+                <a:schemeClr val="accent1">
+                  <a:shade val="50000"/>
+                </a:schemeClr>
+              </a:lnRef>
+              <a:fillRef idx="1">
+                <a:schemeClr val="accent1"/>
+              </a:fillRef>
+              <a:effectRef idx="0">
+                <a:schemeClr val="accent1"/>
+              </a:effectRef>
+              <a:fontRef idx="minor">
+                <a:schemeClr val="lt1"/>
+              </a:fontRef>
+            </p:style>
+            <p:txBody>
+              <a:bodyPr rtlCol="0" anchor="ctr"/>
+              <a:lstStyle/>
+              <a:p>
+                <a:pPr algn="ctr"/>
+                <a:endParaRPr lang="nl-NL"/>
+              </a:p>
+            </p:txBody>
+          </p:sp>
+          <p:sp>
+            <p:nvSpPr>
+              <p:cNvPr id="198" name="Parallelogram 197">
+                <a:extLst>
+                  <a:ext uri="{FF2B5EF4-FFF2-40B4-BE49-F238E27FC236}">
+                    <a16:creationId xmlns:a16="http://schemas.microsoft.com/office/drawing/2014/main" id="{C8D51382-84B4-41DB-9D6E-CE6A4DA09533}"/>
+                  </a:ext>
+                </a:extLst>
+              </p:cNvPr>
+              <p:cNvSpPr/>
+              <p:nvPr/>
+            </p:nvSpPr>
+            <p:spPr>
+              <a:xfrm rot="5400000" flipV="1">
+                <a:off x="3832594" y="2144154"/>
+                <a:ext cx="634053" cy="390186"/>
+              </a:xfrm>
+              <a:prstGeom prst="parallelogram">
+                <a:avLst>
+                  <a:gd name="adj" fmla="val 37500"/>
+                </a:avLst>
+              </a:prstGeom>
+              <a:solidFill>
+                <a:srgbClr val="FF4F4F"/>
+              </a:solidFill>
+              <a:ln w="19050">
+                <a:solidFill>
+                  <a:schemeClr val="bg1"/>
+                </a:solidFill>
+              </a:ln>
+            </p:spPr>
+            <p:style>
+              <a:lnRef idx="2">
+                <a:schemeClr val="accent1">
+                  <a:shade val="50000"/>
+                </a:schemeClr>
+              </a:lnRef>
+              <a:fillRef idx="1">
+                <a:schemeClr val="accent1"/>
+              </a:fillRef>
+              <a:effectRef idx="0">
+                <a:schemeClr val="accent1"/>
+              </a:effectRef>
+              <a:fontRef idx="minor">
+                <a:schemeClr val="lt1"/>
+              </a:fontRef>
+            </p:style>
+            <p:txBody>
+              <a:bodyPr rtlCol="0" anchor="ctr"/>
+              <a:lstStyle/>
+              <a:p>
+                <a:pPr algn="ctr"/>
+                <a:endParaRPr lang="nl-NL"/>
+              </a:p>
+            </p:txBody>
+          </p:sp>
+          <p:sp>
+            <p:nvSpPr>
+              <p:cNvPr id="199" name="Parallelogram 198">
+                <a:extLst>
+                  <a:ext uri="{FF2B5EF4-FFF2-40B4-BE49-F238E27FC236}">
+                    <a16:creationId xmlns:a16="http://schemas.microsoft.com/office/drawing/2014/main" id="{B0EB9E08-FE77-45A8-AB53-5D50061CFD8B}"/>
+                  </a:ext>
+                </a:extLst>
+              </p:cNvPr>
+              <p:cNvSpPr/>
+              <p:nvPr/>
+            </p:nvSpPr>
+            <p:spPr>
+              <a:xfrm rot="5400000" flipV="1">
+                <a:off x="3832594" y="2631887"/>
+                <a:ext cx="634053" cy="390186"/>
+              </a:xfrm>
+              <a:prstGeom prst="parallelogram">
+                <a:avLst>
+                  <a:gd name="adj" fmla="val 37500"/>
+                </a:avLst>
+              </a:prstGeom>
+              <a:solidFill>
+                <a:srgbClr val="FF4F4F"/>
+              </a:solidFill>
+              <a:ln w="19050">
+                <a:solidFill>
+                  <a:schemeClr val="bg1"/>
+                </a:solidFill>
+              </a:ln>
+            </p:spPr>
+            <p:style>
+              <a:lnRef idx="2">
+                <a:schemeClr val="accent1">
+                  <a:shade val="50000"/>
+                </a:schemeClr>
+              </a:lnRef>
+              <a:fillRef idx="1">
+                <a:schemeClr val="accent1"/>
+              </a:fillRef>
+              <a:effectRef idx="0">
+                <a:schemeClr val="accent1"/>
+              </a:effectRef>
+              <a:fontRef idx="minor">
+                <a:schemeClr val="lt1"/>
+              </a:fontRef>
+            </p:style>
+            <p:txBody>
+              <a:bodyPr rtlCol="0" anchor="ctr"/>
+              <a:lstStyle/>
+              <a:p>
+                <a:pPr algn="ctr"/>
+                <a:endParaRPr lang="nl-NL"/>
+              </a:p>
+            </p:txBody>
+          </p:sp>
+          <p:sp>
+            <p:nvSpPr>
+              <p:cNvPr id="200" name="Diamond 199">
+                <a:extLst>
+                  <a:ext uri="{FF2B5EF4-FFF2-40B4-BE49-F238E27FC236}">
+                    <a16:creationId xmlns:a16="http://schemas.microsoft.com/office/drawing/2014/main" id="{51E429C8-30E8-4BA4-A0A7-CB8BF1A31155}"/>
+                  </a:ext>
+                </a:extLst>
+              </p:cNvPr>
+              <p:cNvSpPr/>
+              <p:nvPr/>
+            </p:nvSpPr>
+            <p:spPr>
+              <a:xfrm>
+                <a:off x="3560424" y="1383447"/>
+                <a:ext cx="780372" cy="292640"/>
+              </a:xfrm>
+              <a:prstGeom prst="diamond">
+                <a:avLst/>
+              </a:prstGeom>
+              <a:solidFill>
+                <a:srgbClr val="FF4F4F"/>
+              </a:solidFill>
+              <a:ln w="19050">
+                <a:solidFill>
+                  <a:schemeClr val="bg1"/>
+                </a:solidFill>
+              </a:ln>
+            </p:spPr>
+            <p:style>
+              <a:lnRef idx="2">
+                <a:schemeClr val="accent1">
+                  <a:shade val="50000"/>
+                </a:schemeClr>
+              </a:lnRef>
+              <a:fillRef idx="1">
+                <a:schemeClr val="accent1"/>
+              </a:fillRef>
+              <a:effectRef idx="0">
+                <a:schemeClr val="accent1"/>
+              </a:effectRef>
+              <a:fontRef idx="minor">
+                <a:schemeClr val="lt1"/>
+              </a:fontRef>
+            </p:style>
+            <p:txBody>
+              <a:bodyPr rtlCol="0" anchor="ctr"/>
+              <a:lstStyle/>
+              <a:p>
+                <a:pPr algn="ctr"/>
+                <a:endParaRPr lang="nl-NL"/>
+              </a:p>
+            </p:txBody>
+          </p:sp>
+          <p:sp>
+            <p:nvSpPr>
+              <p:cNvPr id="201" name="Diamond 200">
+                <a:extLst>
+                  <a:ext uri="{FF2B5EF4-FFF2-40B4-BE49-F238E27FC236}">
+                    <a16:creationId xmlns:a16="http://schemas.microsoft.com/office/drawing/2014/main" id="{D990F958-D26E-4DE7-9A29-8AC93AA771C0}"/>
+                  </a:ext>
+                </a:extLst>
+              </p:cNvPr>
+              <p:cNvSpPr/>
+              <p:nvPr/>
+            </p:nvSpPr>
+            <p:spPr>
+              <a:xfrm>
+                <a:off x="3174142" y="1238529"/>
+                <a:ext cx="780372" cy="292640"/>
+              </a:xfrm>
+              <a:prstGeom prst="diamond">
+                <a:avLst/>
+              </a:prstGeom>
+              <a:solidFill>
+                <a:srgbClr val="FF4F4F"/>
+              </a:solidFill>
+              <a:ln w="19050">
+                <a:solidFill>
+                  <a:schemeClr val="bg1"/>
+                </a:solidFill>
+              </a:ln>
+            </p:spPr>
+            <p:style>
+              <a:lnRef idx="2">
+                <a:schemeClr val="accent1">
+                  <a:shade val="50000"/>
+                </a:schemeClr>
+              </a:lnRef>
+              <a:fillRef idx="1">
+                <a:schemeClr val="accent1"/>
+              </a:fillRef>
+              <a:effectRef idx="0">
+                <a:schemeClr val="accent1"/>
+              </a:effectRef>
+              <a:fontRef idx="minor">
+                <a:schemeClr val="lt1"/>
+              </a:fontRef>
+            </p:style>
+            <p:txBody>
+              <a:bodyPr rtlCol="0" anchor="ctr"/>
+              <a:lstStyle/>
+              <a:p>
+                <a:pPr algn="ctr"/>
+                <a:endParaRPr lang="nl-NL"/>
+              </a:p>
+            </p:txBody>
+          </p:sp>
+          <p:sp>
+            <p:nvSpPr>
+              <p:cNvPr id="202" name="Diamond 201">
+                <a:extLst>
+                  <a:ext uri="{FF2B5EF4-FFF2-40B4-BE49-F238E27FC236}">
+                    <a16:creationId xmlns:a16="http://schemas.microsoft.com/office/drawing/2014/main" id="{BB912074-E9A6-4A21-A52A-3988F42EC54C}"/>
+                  </a:ext>
+                </a:extLst>
+              </p:cNvPr>
+              <p:cNvSpPr/>
+              <p:nvPr/>
+            </p:nvSpPr>
+            <p:spPr>
+              <a:xfrm>
+                <a:off x="2788593" y="1091899"/>
+                <a:ext cx="780372" cy="292640"/>
+              </a:xfrm>
+              <a:prstGeom prst="diamond">
+                <a:avLst/>
+              </a:prstGeom>
+              <a:solidFill>
+                <a:srgbClr val="FF4F4F"/>
+              </a:solidFill>
+              <a:ln w="19050">
+                <a:solidFill>
+                  <a:schemeClr val="bg1"/>
+                </a:solidFill>
+              </a:ln>
+            </p:spPr>
+            <p:style>
+              <a:lnRef idx="2">
+                <a:schemeClr val="accent1">
+                  <a:shade val="50000"/>
+                </a:schemeClr>
+              </a:lnRef>
+              <a:fillRef idx="1">
+                <a:schemeClr val="accent1"/>
+              </a:fillRef>
+              <a:effectRef idx="0">
+                <a:schemeClr val="accent1"/>
+              </a:effectRef>
+              <a:fontRef idx="minor">
+                <a:schemeClr val="lt1"/>
+              </a:fontRef>
+            </p:style>
+            <p:txBody>
+              <a:bodyPr rtlCol="0" anchor="ctr"/>
+              <a:lstStyle/>
+              <a:p>
+                <a:pPr algn="ctr"/>
+                <a:endParaRPr lang="nl-NL"/>
+              </a:p>
+            </p:txBody>
+          </p:sp>
+          <p:sp>
+            <p:nvSpPr>
+              <p:cNvPr id="203" name="Parallelogram 202">
+                <a:extLst>
+                  <a:ext uri="{FF2B5EF4-FFF2-40B4-BE49-F238E27FC236}">
+                    <a16:creationId xmlns:a16="http://schemas.microsoft.com/office/drawing/2014/main" id="{7929DD32-0F70-4FC7-BBAC-A3B8A1D1ABBA}"/>
+                  </a:ext>
+                </a:extLst>
+              </p:cNvPr>
+              <p:cNvSpPr/>
+              <p:nvPr/>
+            </p:nvSpPr>
+            <p:spPr>
+              <a:xfrm rot="5400000" flipV="1">
+                <a:off x="4222780" y="1509627"/>
+                <a:ext cx="634053" cy="390186"/>
+              </a:xfrm>
+              <a:prstGeom prst="parallelogram">
+                <a:avLst>
+                  <a:gd name="adj" fmla="val 37500"/>
+                </a:avLst>
+              </a:prstGeom>
+              <a:solidFill>
+                <a:srgbClr val="FF4F4F"/>
+              </a:solidFill>
+              <a:ln w="19050">
+                <a:solidFill>
+                  <a:schemeClr val="bg1"/>
+                </a:solidFill>
+              </a:ln>
+            </p:spPr>
+            <p:style>
+              <a:lnRef idx="2">
+                <a:schemeClr val="accent1">
+                  <a:shade val="50000"/>
+                </a:schemeClr>
+              </a:lnRef>
+              <a:fillRef idx="1">
+                <a:schemeClr val="accent1"/>
+              </a:fillRef>
+              <a:effectRef idx="0">
+                <a:schemeClr val="accent1"/>
+              </a:effectRef>
+              <a:fontRef idx="minor">
+                <a:schemeClr val="lt1"/>
+              </a:fontRef>
+            </p:style>
+            <p:txBody>
+              <a:bodyPr rtlCol="0" anchor="ctr"/>
+              <a:lstStyle/>
+              <a:p>
+                <a:pPr algn="ctr"/>
+                <a:endParaRPr lang="nl-NL"/>
+              </a:p>
+            </p:txBody>
+          </p:sp>
+          <p:sp>
+            <p:nvSpPr>
+              <p:cNvPr id="204" name="Parallelogram 203">
+                <a:extLst>
+                  <a:ext uri="{FF2B5EF4-FFF2-40B4-BE49-F238E27FC236}">
+                    <a16:creationId xmlns:a16="http://schemas.microsoft.com/office/drawing/2014/main" id="{6A1F5B0F-67E4-4C90-82C1-0ABB61AE534C}"/>
+                  </a:ext>
+                </a:extLst>
+              </p:cNvPr>
+              <p:cNvSpPr/>
+              <p:nvPr/>
+            </p:nvSpPr>
+            <p:spPr>
+              <a:xfrm rot="5400000" flipV="1">
+                <a:off x="4222780" y="1997834"/>
+                <a:ext cx="634053" cy="390186"/>
+              </a:xfrm>
+              <a:prstGeom prst="parallelogram">
+                <a:avLst>
+                  <a:gd name="adj" fmla="val 37500"/>
+                </a:avLst>
+              </a:prstGeom>
+              <a:solidFill>
+                <a:srgbClr val="FF4F4F"/>
+              </a:solidFill>
+              <a:ln w="19050">
+                <a:solidFill>
+                  <a:schemeClr val="bg1"/>
+                </a:solidFill>
+              </a:ln>
+            </p:spPr>
+            <p:style>
+              <a:lnRef idx="2">
+                <a:schemeClr val="accent1">
+                  <a:shade val="50000"/>
+                </a:schemeClr>
+              </a:lnRef>
+              <a:fillRef idx="1">
+                <a:schemeClr val="accent1"/>
+              </a:fillRef>
+              <a:effectRef idx="0">
+                <a:schemeClr val="accent1"/>
+              </a:effectRef>
+              <a:fontRef idx="minor">
+                <a:schemeClr val="lt1"/>
+              </a:fontRef>
+            </p:style>
+            <p:txBody>
+              <a:bodyPr rtlCol="0" anchor="ctr"/>
+              <a:lstStyle/>
+              <a:p>
+                <a:pPr algn="ctr"/>
+                <a:endParaRPr lang="nl-NL"/>
+              </a:p>
+            </p:txBody>
+          </p:sp>
+          <p:sp>
+            <p:nvSpPr>
+              <p:cNvPr id="205" name="Parallelogram 204">
+                <a:extLst>
+                  <a:ext uri="{FF2B5EF4-FFF2-40B4-BE49-F238E27FC236}">
+                    <a16:creationId xmlns:a16="http://schemas.microsoft.com/office/drawing/2014/main" id="{AFC9397F-F87A-4D63-8FD5-9AB0E9986B23}"/>
+                  </a:ext>
+                </a:extLst>
+              </p:cNvPr>
+              <p:cNvSpPr/>
+              <p:nvPr/>
+            </p:nvSpPr>
+            <p:spPr>
+              <a:xfrm rot="5400000" flipV="1">
+                <a:off x="4222780" y="2485566"/>
+                <a:ext cx="634053" cy="390186"/>
+              </a:xfrm>
+              <a:prstGeom prst="parallelogram">
+                <a:avLst>
+                  <a:gd name="adj" fmla="val 37500"/>
+                </a:avLst>
+              </a:prstGeom>
+              <a:solidFill>
+                <a:srgbClr val="FF4F4F"/>
+              </a:solidFill>
+              <a:ln w="19050">
+                <a:solidFill>
+                  <a:schemeClr val="bg1"/>
+                </a:solidFill>
+              </a:ln>
+            </p:spPr>
+            <p:style>
+              <a:lnRef idx="2">
+                <a:schemeClr val="accent1">
+                  <a:shade val="50000"/>
+                </a:schemeClr>
+              </a:lnRef>
+              <a:fillRef idx="1">
+                <a:schemeClr val="accent1"/>
+              </a:fillRef>
+              <a:effectRef idx="0">
+                <a:schemeClr val="accent1"/>
+              </a:effectRef>
+              <a:fontRef idx="minor">
+                <a:schemeClr val="lt1"/>
+              </a:fontRef>
+            </p:style>
+            <p:txBody>
+              <a:bodyPr rtlCol="0" anchor="ctr"/>
+              <a:lstStyle/>
+              <a:p>
+                <a:pPr algn="ctr"/>
+                <a:endParaRPr lang="nl-NL"/>
+              </a:p>
+            </p:txBody>
+          </p:sp>
+          <p:sp>
+            <p:nvSpPr>
+              <p:cNvPr id="206" name="Diamond 205">
+                <a:extLst>
+                  <a:ext uri="{FF2B5EF4-FFF2-40B4-BE49-F238E27FC236}">
+                    <a16:creationId xmlns:a16="http://schemas.microsoft.com/office/drawing/2014/main" id="{AE3AC575-3B7C-4673-9391-F16269D4B7A5}"/>
+                  </a:ext>
+                </a:extLst>
+              </p:cNvPr>
+              <p:cNvSpPr/>
+              <p:nvPr/>
+            </p:nvSpPr>
+            <p:spPr>
+              <a:xfrm>
+                <a:off x="3950747" y="1237148"/>
+                <a:ext cx="780372" cy="292640"/>
+              </a:xfrm>
+              <a:prstGeom prst="diamond">
+                <a:avLst/>
+              </a:prstGeom>
+              <a:solidFill>
+                <a:srgbClr val="FF4F4F"/>
+              </a:solidFill>
+              <a:ln w="19050">
+                <a:solidFill>
+                  <a:schemeClr val="bg1"/>
+                </a:solidFill>
+              </a:ln>
+            </p:spPr>
+            <p:style>
+              <a:lnRef idx="2">
+                <a:schemeClr val="accent1">
+                  <a:shade val="50000"/>
+                </a:schemeClr>
+              </a:lnRef>
+              <a:fillRef idx="1">
+                <a:schemeClr val="accent1"/>
+              </a:fillRef>
+              <a:effectRef idx="0">
+                <a:schemeClr val="accent1"/>
+              </a:effectRef>
+              <a:fontRef idx="minor">
+                <a:schemeClr val="lt1"/>
+              </a:fontRef>
+            </p:style>
+            <p:txBody>
+              <a:bodyPr rtlCol="0" anchor="ctr"/>
+              <a:lstStyle/>
+              <a:p>
+                <a:pPr algn="ctr"/>
+                <a:endParaRPr lang="nl-NL"/>
+              </a:p>
+            </p:txBody>
+          </p:sp>
+          <p:sp>
+            <p:nvSpPr>
+              <p:cNvPr id="207" name="Diamond 206">
+                <a:extLst>
+                  <a:ext uri="{FF2B5EF4-FFF2-40B4-BE49-F238E27FC236}">
+                    <a16:creationId xmlns:a16="http://schemas.microsoft.com/office/drawing/2014/main" id="{C89537B0-315F-4A6E-9058-7546A9B7D425}"/>
+                  </a:ext>
+                </a:extLst>
+              </p:cNvPr>
+              <p:cNvSpPr/>
+              <p:nvPr/>
+            </p:nvSpPr>
+            <p:spPr>
+              <a:xfrm>
+                <a:off x="3564134" y="1092374"/>
+                <a:ext cx="780372" cy="292640"/>
+              </a:xfrm>
+              <a:prstGeom prst="diamond">
+                <a:avLst/>
+              </a:prstGeom>
+              <a:solidFill>
+                <a:srgbClr val="FF4F4F"/>
+              </a:solidFill>
+              <a:ln w="19050">
+                <a:solidFill>
+                  <a:schemeClr val="bg1"/>
+                </a:solidFill>
+              </a:ln>
+            </p:spPr>
+            <p:style>
+              <a:lnRef idx="2">
+                <a:schemeClr val="accent1">
+                  <a:shade val="50000"/>
+                </a:schemeClr>
+              </a:lnRef>
+              <a:fillRef idx="1">
+                <a:schemeClr val="accent1"/>
+              </a:fillRef>
+              <a:effectRef idx="0">
+                <a:schemeClr val="accent1"/>
+              </a:effectRef>
+              <a:fontRef idx="minor">
+                <a:schemeClr val="lt1"/>
+              </a:fontRef>
+            </p:style>
+            <p:txBody>
+              <a:bodyPr rtlCol="0" anchor="ctr"/>
+              <a:lstStyle/>
+              <a:p>
+                <a:pPr algn="ctr"/>
+                <a:endParaRPr lang="nl-NL"/>
+              </a:p>
+            </p:txBody>
+          </p:sp>
+          <p:sp>
+            <p:nvSpPr>
+              <p:cNvPr id="208" name="Diamond 207">
+                <a:extLst>
+                  <a:ext uri="{FF2B5EF4-FFF2-40B4-BE49-F238E27FC236}">
+                    <a16:creationId xmlns:a16="http://schemas.microsoft.com/office/drawing/2014/main" id="{FE25E567-5F61-4F6A-B9B0-1E8B024860D9}"/>
+                  </a:ext>
+                </a:extLst>
+              </p:cNvPr>
+              <p:cNvSpPr/>
+              <p:nvPr/>
+            </p:nvSpPr>
+            <p:spPr>
+              <a:xfrm>
+                <a:off x="3174796" y="946033"/>
+                <a:ext cx="780372" cy="292640"/>
+              </a:xfrm>
+              <a:prstGeom prst="diamond">
+                <a:avLst/>
+              </a:prstGeom>
+              <a:solidFill>
+                <a:srgbClr val="FF4F4F"/>
+              </a:solidFill>
+              <a:ln w="19050">
+                <a:solidFill>
+                  <a:schemeClr val="bg1"/>
+                </a:solidFill>
+              </a:ln>
+            </p:spPr>
+            <p:style>
+              <a:lnRef idx="2">
+                <a:schemeClr val="accent1">
+                  <a:shade val="50000"/>
+                </a:schemeClr>
+              </a:lnRef>
+              <a:fillRef idx="1">
+                <a:schemeClr val="accent1"/>
+              </a:fillRef>
+              <a:effectRef idx="0">
+                <a:schemeClr val="accent1"/>
+              </a:effectRef>
+              <a:fontRef idx="minor">
+                <a:schemeClr val="lt1"/>
+              </a:fontRef>
+            </p:style>
+            <p:txBody>
+              <a:bodyPr rtlCol="0" anchor="ctr"/>
+              <a:lstStyle/>
+              <a:p>
+                <a:pPr algn="ctr"/>
+                <a:endParaRPr lang="nl-NL"/>
+              </a:p>
+            </p:txBody>
+          </p:sp>
+        </p:grpSp>
+        <p:sp>
+          <p:nvSpPr>
+            <p:cNvPr id="215" name="TextBox 214">
+              <a:extLst>
+                <a:ext uri="{FF2B5EF4-FFF2-40B4-BE49-F238E27FC236}">
+                  <a16:creationId xmlns:a16="http://schemas.microsoft.com/office/drawing/2014/main" id="{70CD4ADC-7275-4D1C-9FC7-2F333635B4E0}"/>
+                </a:ext>
+              </a:extLst>
+            </p:cNvPr>
+            <p:cNvSpPr txBox="1"/>
+            <p:nvPr/>
+          </p:nvSpPr>
+          <p:spPr>
+            <a:xfrm>
+              <a:off x="9789557" y="2815053"/>
+              <a:ext cx="564578" cy="215444"/>
+            </a:xfrm>
+            <a:prstGeom prst="rect">
+              <a:avLst/>
+            </a:prstGeom>
+            <a:noFill/>
+          </p:spPr>
           <p:txBody>
-            <a:bodyPr rtlCol="0" anchor="ctr"/>
+            <a:bodyPr wrap="none" rtlCol="0">
+              <a:spAutoFit/>
+            </a:bodyPr>
             <a:lstStyle/>
             <a:p>
-              <a:pPr algn="ctr"/>
-              <a:endParaRPr lang="nl-NL"/>
+              <a:r>
+                <a:rPr lang="en-GB" sz="800" b="1" dirty="0">
+                  <a:solidFill>
+                    <a:schemeClr val="bg2">
+                      <a:lumMod val="50000"/>
+                    </a:schemeClr>
+                  </a:solidFill>
+                </a:rPr>
+                <a:t>February</a:t>
+              </a:r>
+              <a:endParaRPr lang="nl-NL" b="1" dirty="0">
+                <a:solidFill>
+                  <a:schemeClr val="bg2">
+                    <a:lumMod val="50000"/>
+                  </a:schemeClr>
+                </a:solidFill>
+              </a:endParaRPr>
             </a:p>
           </p:txBody>
         </p:sp>
         <p:sp>
           <p:nvSpPr>
-            <p:cNvPr id="186" name="Parallelogram 185">
+            <p:cNvPr id="216" name="TextBox 215">
               <a:extLst>
                 <a:ext uri="{FF2B5EF4-FFF2-40B4-BE49-F238E27FC236}">
-                  <a16:creationId xmlns:a16="http://schemas.microsoft.com/office/drawing/2014/main" id="{7E22B997-BB54-4DC6-8784-2BA3EA04006E}"/>
+                  <a16:creationId xmlns:a16="http://schemas.microsoft.com/office/drawing/2014/main" id="{8ABE965A-DEF6-4994-9B4E-D329F8302AAC}"/>
                 </a:ext>
               </a:extLst>
             </p:cNvPr>
-            <p:cNvSpPr/>
+            <p:cNvSpPr txBox="1"/>
             <p:nvPr/>
           </p:nvSpPr>
           <p:spPr>
-            <a:xfrm rot="5400000" flipV="1">
-              <a:off x="3442408" y="2778206"/>
-              <a:ext cx="634053" cy="390186"/>
+            <a:xfrm>
+              <a:off x="10040483" y="2719324"/>
+              <a:ext cx="460382" cy="215444"/>
             </a:xfrm>
-            <a:prstGeom prst="parallelogram">
-              <a:avLst>
-                <a:gd name="adj" fmla="val 37500"/>
-              </a:avLst>
+            <a:prstGeom prst="rect">
+              <a:avLst/>
             </a:prstGeom>
-            <a:solidFill>
-              <a:srgbClr val="FF4F4F"/>
-            </a:solidFill>
-            <a:ln w="19050">
+            <a:noFill/>
+          </p:spPr>
+          <p:txBody>
+            <a:bodyPr wrap="none" rtlCol="0">
+              <a:spAutoFit/>
+            </a:bodyPr>
+            <a:lstStyle/>
+            <a:p>
+              <a:r>
+                <a:rPr lang="en-GB" sz="800" b="1" dirty="0">
+                  <a:solidFill>
+                    <a:schemeClr val="bg2">
+                      <a:lumMod val="50000"/>
+                    </a:schemeClr>
+                  </a:solidFill>
+                </a:rPr>
+                <a:t>March</a:t>
+              </a:r>
+              <a:endParaRPr lang="nl-NL" b="1" dirty="0">
+                <a:solidFill>
+                  <a:schemeClr val="bg2">
+                    <a:lumMod val="50000"/>
+                  </a:schemeClr>
+                </a:solidFill>
+              </a:endParaRPr>
+            </a:p>
+          </p:txBody>
+        </p:sp>
+        <p:sp>
+          <p:nvSpPr>
+            <p:cNvPr id="219" name="TextBox 218">
+              <a:extLst>
+                <a:ext uri="{FF2B5EF4-FFF2-40B4-BE49-F238E27FC236}">
+                  <a16:creationId xmlns:a16="http://schemas.microsoft.com/office/drawing/2014/main" id="{B9910D21-EE82-4052-A9FD-58F9F9002C75}"/>
+                </a:ext>
+              </a:extLst>
+            </p:cNvPr>
+            <p:cNvSpPr txBox="1"/>
+            <p:nvPr/>
+          </p:nvSpPr>
+          <p:spPr>
+            <a:xfrm>
+              <a:off x="8697322" y="2796592"/>
+              <a:ext cx="604653" cy="215444"/>
+            </a:xfrm>
+            <a:prstGeom prst="rect">
+              <a:avLst/>
+            </a:prstGeom>
+            <a:noFill/>
+          </p:spPr>
+          <p:txBody>
+            <a:bodyPr wrap="none" rtlCol="0">
+              <a:spAutoFit/>
+            </a:bodyPr>
+            <a:lstStyle/>
+            <a:p>
+              <a:r>
+                <a:rPr lang="en-GB" sz="800" b="1" dirty="0">
+                  <a:solidFill>
+                    <a:schemeClr val="bg2">
+                      <a:lumMod val="50000"/>
+                    </a:schemeClr>
+                  </a:solidFill>
+                </a:rPr>
+                <a:t>Mountain</a:t>
+              </a:r>
+              <a:endParaRPr lang="nl-NL" b="1" dirty="0">
+                <a:solidFill>
+                  <a:schemeClr val="bg2">
+                    <a:lumMod val="50000"/>
+                  </a:schemeClr>
+                </a:solidFill>
+              </a:endParaRPr>
+            </a:p>
+          </p:txBody>
+        </p:sp>
+        <p:sp>
+          <p:nvSpPr>
+            <p:cNvPr id="220" name="TextBox 219">
+              <a:extLst>
+                <a:ext uri="{FF2B5EF4-FFF2-40B4-BE49-F238E27FC236}">
+                  <a16:creationId xmlns:a16="http://schemas.microsoft.com/office/drawing/2014/main" id="{89262747-5F30-4635-9C1F-4E13BB29DD79}"/>
+                </a:ext>
+              </a:extLst>
+            </p:cNvPr>
+            <p:cNvSpPr txBox="1"/>
+            <p:nvPr/>
+          </p:nvSpPr>
+          <p:spPr>
+            <a:xfrm>
+              <a:off x="8620657" y="2704007"/>
+              <a:ext cx="388248" cy="215444"/>
+            </a:xfrm>
+            <a:prstGeom prst="rect">
+              <a:avLst/>
+            </a:prstGeom>
+            <a:noFill/>
+          </p:spPr>
+          <p:txBody>
+            <a:bodyPr wrap="none" rtlCol="0">
+              <a:spAutoFit/>
+            </a:bodyPr>
+            <a:lstStyle/>
+            <a:p>
+              <a:r>
+                <a:rPr lang="en-GB" sz="800" b="1" dirty="0">
+                  <a:solidFill>
+                    <a:schemeClr val="bg2">
+                      <a:lumMod val="50000"/>
+                    </a:schemeClr>
+                  </a:solidFill>
+                </a:rPr>
+                <a:t>BMX</a:t>
+              </a:r>
+              <a:endParaRPr lang="nl-NL" b="1" dirty="0">
+                <a:solidFill>
+                  <a:schemeClr val="bg2">
+                    <a:lumMod val="50000"/>
+                  </a:schemeClr>
+                </a:solidFill>
+              </a:endParaRPr>
+            </a:p>
+          </p:txBody>
+        </p:sp>
+        <p:cxnSp>
+          <p:nvCxnSpPr>
+            <p:cNvPr id="221" name="Straight Arrow Connector 220">
+              <a:extLst>
+                <a:ext uri="{FF2B5EF4-FFF2-40B4-BE49-F238E27FC236}">
+                  <a16:creationId xmlns:a16="http://schemas.microsoft.com/office/drawing/2014/main" id="{03C4B0AE-B23C-4358-AD68-106860A17B26}"/>
+                </a:ext>
+              </a:extLst>
+            </p:cNvPr>
+            <p:cNvCxnSpPr>
+              <a:cxnSpLocks/>
+            </p:cNvCxnSpPr>
+            <p:nvPr/>
+          </p:nvCxnSpPr>
+          <p:spPr>
+            <a:xfrm flipV="1">
+              <a:off x="8754780" y="1880262"/>
+              <a:ext cx="0" cy="302684"/>
+            </a:xfrm>
+            <a:prstGeom prst="straightConnector1">
+              <a:avLst/>
+            </a:prstGeom>
+            <a:ln w="19050" cap="rnd">
               <a:solidFill>
-                <a:schemeClr val="bg1"/>
+                <a:schemeClr val="bg2">
+                  <a:lumMod val="50000"/>
+                </a:schemeClr>
               </a:solidFill>
+              <a:bevel/>
+              <a:headEnd type="oval" w="sm" len="med"/>
+              <a:tailEnd type="oval" w="sm" len="med"/>
             </a:ln>
           </p:spPr>
           <p:style>
-            <a:lnRef idx="2">
-              <a:schemeClr val="accent1">
-                <a:shade val="50000"/>
-              </a:schemeClr>
+            <a:lnRef idx="1">
+              <a:schemeClr val="accent1"/>
             </a:lnRef>
-            <a:fillRef idx="1">
+            <a:fillRef idx="0">
               <a:schemeClr val="accent1"/>
             </a:fillRef>
             <a:effectRef idx="0">
               <a:schemeClr val="accent1"/>
             </a:effectRef>
             <a:fontRef idx="minor">
-              <a:schemeClr val="lt1"/>
+              <a:schemeClr val="tx1"/>
             </a:fontRef>
           </p:style>
-          <p:txBody>
-            <a:bodyPr rtlCol="0" anchor="ctr"/>
-            <a:lstStyle/>
-            <a:p>
-              <a:pPr algn="ctr"/>
-              <a:endParaRPr lang="nl-NL"/>
-            </a:p>
-          </p:txBody>
-        </p:sp>
-        <p:sp>
-          <p:nvSpPr>
-            <p:cNvPr id="187" name="Parallelogram 186">
+        </p:cxnSp>
+        <p:cxnSp>
+          <p:nvCxnSpPr>
+            <p:cNvPr id="222" name="Straight Arrow Connector 221">
               <a:extLst>
                 <a:ext uri="{FF2B5EF4-FFF2-40B4-BE49-F238E27FC236}">
-                  <a16:creationId xmlns:a16="http://schemas.microsoft.com/office/drawing/2014/main" id="{7940A30B-9B5C-4769-8B73-755578DD59F3}"/>
+                  <a16:creationId xmlns:a16="http://schemas.microsoft.com/office/drawing/2014/main" id="{CD656F19-B6EC-4304-A73C-7C8158C76B40}"/>
                 </a:ext>
               </a:extLst>
             </p:cNvPr>
-            <p:cNvSpPr/>
+            <p:cNvCxnSpPr>
+              <a:cxnSpLocks/>
+            </p:cNvCxnSpPr>
             <p:nvPr/>
-          </p:nvSpPr>
+          </p:nvCxnSpPr>
           <p:spPr>
-            <a:xfrm rot="5400000">
-              <a:off x="3052221" y="2290000"/>
-              <a:ext cx="634053" cy="390186"/>
+            <a:xfrm flipV="1">
+              <a:off x="8754780" y="2157546"/>
+              <a:ext cx="0" cy="315383"/>
             </a:xfrm>
-            <a:prstGeom prst="parallelogram">
-              <a:avLst>
-                <a:gd name="adj" fmla="val 37500"/>
-              </a:avLst>
+            <a:prstGeom prst="straightConnector1">
+              <a:avLst/>
             </a:prstGeom>
-            <a:solidFill>
-              <a:srgbClr val="FF4F4F"/>
-            </a:solidFill>
-            <a:ln w="19050">
+            <a:ln w="19050" cap="rnd">
               <a:solidFill>
-                <a:schemeClr val="bg1"/>
+                <a:schemeClr val="bg2">
+                  <a:lumMod val="50000"/>
+                </a:schemeClr>
               </a:solidFill>
+              <a:bevel/>
+              <a:headEnd type="oval" w="sm" len="med"/>
+              <a:tailEnd type="none"/>
             </a:ln>
           </p:spPr>
           <p:style>
-            <a:lnRef idx="2">
-              <a:schemeClr val="accent1">
-                <a:shade val="50000"/>
-              </a:schemeClr>
+            <a:lnRef idx="1">
+              <a:schemeClr val="accent1"/>
             </a:lnRef>
-            <a:fillRef idx="1">
+            <a:fillRef idx="0">
               <a:schemeClr val="accent1"/>
             </a:fillRef>
             <a:effectRef idx="0">
               <a:schemeClr val="accent1"/>
             </a:effectRef>
             <a:fontRef idx="minor">
-              <a:schemeClr val="lt1"/>
+              <a:schemeClr val="tx1"/>
             </a:fontRef>
           </p:style>
+        </p:cxnSp>
+        <p:sp>
+          <p:nvSpPr>
+            <p:cNvPr id="228" name="TextBox 227">
+              <a:extLst>
+                <a:ext uri="{FF2B5EF4-FFF2-40B4-BE49-F238E27FC236}">
+                  <a16:creationId xmlns:a16="http://schemas.microsoft.com/office/drawing/2014/main" id="{3D239D40-74A1-4372-9099-E8BE74B81BE3}"/>
+                </a:ext>
+              </a:extLst>
+            </p:cNvPr>
+            <p:cNvSpPr txBox="1"/>
+            <p:nvPr/>
+          </p:nvSpPr>
+          <p:spPr>
+            <a:xfrm>
+              <a:off x="8278261" y="2355318"/>
+              <a:ext cx="495649" cy="215444"/>
+            </a:xfrm>
+            <a:prstGeom prst="rect">
+              <a:avLst/>
+            </a:prstGeom>
+            <a:noFill/>
+          </p:spPr>
           <p:txBody>
-            <a:bodyPr rtlCol="0" anchor="ctr"/>
+            <a:bodyPr wrap="none" rtlCol="0">
+              <a:spAutoFit/>
+            </a:bodyPr>
             <a:lstStyle/>
             <a:p>
-              <a:pPr algn="ctr"/>
-              <a:endParaRPr lang="nl-NL"/>
+              <a:r>
+                <a:rPr lang="en-GB" sz="800" b="1" dirty="0">
+                  <a:solidFill>
+                    <a:schemeClr val="bg2">
+                      <a:lumMod val="50000"/>
+                    </a:schemeClr>
+                  </a:solidFill>
+                </a:rPr>
+                <a:t>Taiwan</a:t>
+              </a:r>
+              <a:endParaRPr lang="nl-NL" b="1" dirty="0">
+                <a:solidFill>
+                  <a:schemeClr val="bg2">
+                    <a:lumMod val="50000"/>
+                  </a:schemeClr>
+                </a:solidFill>
+              </a:endParaRPr>
             </a:p>
           </p:txBody>
         </p:sp>
         <p:sp>
           <p:nvSpPr>
-            <p:cNvPr id="188" name="Parallelogram 187">
+            <p:cNvPr id="229" name="TextBox 228">
               <a:extLst>
                 <a:ext uri="{FF2B5EF4-FFF2-40B4-BE49-F238E27FC236}">
-                  <a16:creationId xmlns:a16="http://schemas.microsoft.com/office/drawing/2014/main" id="{3A3A5337-41DF-4F29-8620-36F3B0BCAE41}"/>
+                  <a16:creationId xmlns:a16="http://schemas.microsoft.com/office/drawing/2014/main" id="{98A362B0-FB4E-4C02-9F40-007C8F1D7CE9}"/>
                 </a:ext>
               </a:extLst>
             </p:cNvPr>
-            <p:cNvSpPr/>
+            <p:cNvSpPr txBox="1"/>
             <p:nvPr/>
           </p:nvSpPr>
           <p:spPr>
-            <a:xfrm rot="5400000">
-              <a:off x="3052220" y="2778206"/>
-              <a:ext cx="634053" cy="390186"/>
+            <a:xfrm>
+              <a:off x="8335394" y="2067065"/>
+              <a:ext cx="425116" cy="215444"/>
             </a:xfrm>
-            <a:prstGeom prst="parallelogram">
-              <a:avLst>
-                <a:gd name="adj" fmla="val 37500"/>
-              </a:avLst>
+            <a:prstGeom prst="rect">
+              <a:avLst/>
             </a:prstGeom>
-            <a:solidFill>
-              <a:srgbClr val="FF4F4F"/>
-            </a:solidFill>
-            <a:ln w="19050">
-              <a:solidFill>
-                <a:schemeClr val="bg1"/>
-              </a:solidFill>
-            </a:ln>
+            <a:noFill/>
           </p:spPr>
-          <p:style>
-            <a:lnRef idx="2">
-              <a:schemeClr val="accent1">
-                <a:shade val="50000"/>
-              </a:schemeClr>
-            </a:lnRef>
-            <a:fillRef idx="1">
-              <a:schemeClr val="accent1"/>
-            </a:fillRef>
-            <a:effectRef idx="0">
-              <a:schemeClr val="accent1"/>
-            </a:effectRef>
-            <a:fontRef idx="minor">
-              <a:schemeClr val="lt1"/>
-            </a:fontRef>
-          </p:style>
           <p:txBody>
-            <a:bodyPr rtlCol="0" anchor="ctr"/>
+            <a:bodyPr wrap="none" rtlCol="0">
+              <a:spAutoFit/>
+            </a:bodyPr>
             <a:lstStyle/>
             <a:p>
-              <a:pPr algn="ctr"/>
-              <a:endParaRPr lang="nl-NL"/>
+              <a:r>
+                <a:rPr lang="en-GB" sz="800" b="1" dirty="0">
+                  <a:solidFill>
+                    <a:schemeClr val="bg2">
+                      <a:lumMod val="50000"/>
+                    </a:schemeClr>
+                  </a:solidFill>
+                </a:rPr>
+                <a:t>China</a:t>
+              </a:r>
+              <a:endParaRPr lang="nl-NL" b="1" dirty="0">
+                <a:solidFill>
+                  <a:schemeClr val="bg2">
+                    <a:lumMod val="50000"/>
+                  </a:schemeClr>
+                </a:solidFill>
+              </a:endParaRPr>
             </a:p>
           </p:txBody>
         </p:sp>
         <p:sp>
           <p:nvSpPr>
-            <p:cNvPr id="189" name="Parallelogram 188">
+            <p:cNvPr id="230" name="TextBox 229">
               <a:extLst>
                 <a:ext uri="{FF2B5EF4-FFF2-40B4-BE49-F238E27FC236}">
-                  <a16:creationId xmlns:a16="http://schemas.microsoft.com/office/drawing/2014/main" id="{587E7F14-74AE-4841-BB6E-5EE7AC139FCE}"/>
+                  <a16:creationId xmlns:a16="http://schemas.microsoft.com/office/drawing/2014/main" id="{4B1E5F4F-EDB7-4087-82C4-C3E36328351E}"/>
                 </a:ext>
               </a:extLst>
             </p:cNvPr>
-            <p:cNvSpPr/>
-            <p:nvPr/>
-          </p:nvSpPr>
-          <p:spPr>
-            <a:xfrm rot="5400000">
-              <a:off x="2662032" y="1655947"/>
-              <a:ext cx="634053" cy="390186"/>
-            </a:xfrm>
-            <a:prstGeom prst="parallelogram">
-              <a:avLst>
-                <a:gd name="adj" fmla="val 37500"/>
-              </a:avLst>
-            </a:prstGeom>
-            <a:solidFill>
-              <a:srgbClr val="FF4F4F"/>
-            </a:solidFill>
-            <a:ln w="19050">
-              <a:solidFill>
-                <a:schemeClr val="bg1"/>
-              </a:solidFill>
-            </a:ln>
-          </p:spPr>
-          <p:style>
-            <a:lnRef idx="2">
-              <a:schemeClr val="accent1">
-                <a:shade val="50000"/>
-              </a:schemeClr>
-            </a:lnRef>
-            <a:fillRef idx="1">
-              <a:schemeClr val="accent1"/>
-            </a:fillRef>
-            <a:effectRef idx="0">
-              <a:schemeClr val="accent1"/>
-            </a:effectRef>
-            <a:fontRef idx="minor">
-              <a:schemeClr val="lt1"/>
-            </a:fontRef>
-          </p:style>
-          <p:txBody>
-            <a:bodyPr rtlCol="0" anchor="ctr"/>
-            <a:lstStyle/>
-            <a:p>
-              <a:pPr algn="ctr"/>
-              <a:endParaRPr lang="nl-NL"/>
-            </a:p>
-          </p:txBody>
-        </p:sp>
-        <p:sp>
-          <p:nvSpPr>
-            <p:cNvPr id="190" name="Parallelogram 189">
-              <a:extLst>
-                <a:ext uri="{FF2B5EF4-FFF2-40B4-BE49-F238E27FC236}">
-                  <a16:creationId xmlns:a16="http://schemas.microsoft.com/office/drawing/2014/main" id="{5AF1AFBD-8AE0-4D1A-B508-C912DEE0BE40}"/>
-                </a:ext>
-              </a:extLst>
-            </p:cNvPr>
-            <p:cNvSpPr/>
-            <p:nvPr/>
-          </p:nvSpPr>
-          <p:spPr>
-            <a:xfrm rot="5400000">
-              <a:off x="2662031" y="2143679"/>
-              <a:ext cx="634053" cy="390186"/>
-            </a:xfrm>
-            <a:prstGeom prst="parallelogram">
-              <a:avLst>
-                <a:gd name="adj" fmla="val 37500"/>
-              </a:avLst>
-            </a:prstGeom>
-            <a:solidFill>
-              <a:srgbClr val="FF4F4F"/>
-            </a:solidFill>
-            <a:ln w="19050">
-              <a:solidFill>
-                <a:schemeClr val="bg1"/>
-              </a:solidFill>
-            </a:ln>
-          </p:spPr>
-          <p:style>
-            <a:lnRef idx="2">
-              <a:schemeClr val="accent1">
-                <a:shade val="50000"/>
-              </a:schemeClr>
-            </a:lnRef>
-            <a:fillRef idx="1">
-              <a:schemeClr val="accent1"/>
-            </a:fillRef>
-            <a:effectRef idx="0">
-              <a:schemeClr val="accent1"/>
-            </a:effectRef>
-            <a:fontRef idx="minor">
-              <a:schemeClr val="lt1"/>
-            </a:fontRef>
-          </p:style>
-          <p:txBody>
-            <a:bodyPr rtlCol="0" anchor="ctr"/>
-            <a:lstStyle/>
-            <a:p>
-              <a:pPr algn="ctr"/>
-              <a:endParaRPr lang="nl-NL"/>
-            </a:p>
-          </p:txBody>
-        </p:sp>
-        <p:sp>
-          <p:nvSpPr>
-            <p:cNvPr id="191" name="Parallelogram 190">
-              <a:extLst>
-                <a:ext uri="{FF2B5EF4-FFF2-40B4-BE49-F238E27FC236}">
-                  <a16:creationId xmlns:a16="http://schemas.microsoft.com/office/drawing/2014/main" id="{90A6B61F-90EF-4DB4-AA1F-BD5FD628C8A6}"/>
-                </a:ext>
-              </a:extLst>
-            </p:cNvPr>
-            <p:cNvSpPr/>
-            <p:nvPr/>
-          </p:nvSpPr>
-          <p:spPr>
-            <a:xfrm rot="5400000">
-              <a:off x="2662030" y="2631886"/>
-              <a:ext cx="634053" cy="390186"/>
-            </a:xfrm>
-            <a:prstGeom prst="parallelogram">
-              <a:avLst>
-                <a:gd name="adj" fmla="val 37500"/>
-              </a:avLst>
-            </a:prstGeom>
-            <a:solidFill>
-              <a:srgbClr val="FF4F4F"/>
-            </a:solidFill>
-            <a:ln w="19050">
-              <a:solidFill>
-                <a:schemeClr val="bg1"/>
-              </a:solidFill>
-            </a:ln>
-          </p:spPr>
-          <p:style>
-            <a:lnRef idx="2">
-              <a:schemeClr val="accent1">
-                <a:shade val="50000"/>
-              </a:schemeClr>
-            </a:lnRef>
-            <a:fillRef idx="1">
-              <a:schemeClr val="accent1"/>
-            </a:fillRef>
-            <a:effectRef idx="0">
-              <a:schemeClr val="accent1"/>
-            </a:effectRef>
-            <a:fontRef idx="minor">
-              <a:schemeClr val="lt1"/>
-            </a:fontRef>
-          </p:style>
-          <p:txBody>
-            <a:bodyPr rtlCol="0" anchor="ctr"/>
-            <a:lstStyle/>
-            <a:p>
-              <a:pPr algn="ctr"/>
-              <a:endParaRPr lang="nl-NL"/>
-            </a:p>
-          </p:txBody>
-        </p:sp>
-        <p:sp>
-          <p:nvSpPr>
-            <p:cNvPr id="192" name="Parallelogram 191">
-              <a:extLst>
-                <a:ext uri="{FF2B5EF4-FFF2-40B4-BE49-F238E27FC236}">
-                  <a16:creationId xmlns:a16="http://schemas.microsoft.com/office/drawing/2014/main" id="{7C3BF5F5-2019-4B56-BD85-BB3B698F7A58}"/>
-                </a:ext>
-              </a:extLst>
-            </p:cNvPr>
-            <p:cNvSpPr/>
-            <p:nvPr/>
-          </p:nvSpPr>
-          <p:spPr>
-            <a:xfrm rot="5400000">
-              <a:off x="2271839" y="1510101"/>
-              <a:ext cx="634053" cy="390186"/>
-            </a:xfrm>
-            <a:prstGeom prst="parallelogram">
-              <a:avLst>
-                <a:gd name="adj" fmla="val 37500"/>
-              </a:avLst>
-            </a:prstGeom>
-            <a:solidFill>
-              <a:srgbClr val="FF4F4F"/>
-            </a:solidFill>
-            <a:ln w="19050">
-              <a:solidFill>
-                <a:schemeClr val="bg1"/>
-              </a:solidFill>
-            </a:ln>
-          </p:spPr>
-          <p:style>
-            <a:lnRef idx="2">
-              <a:schemeClr val="accent1">
-                <a:shade val="50000"/>
-              </a:schemeClr>
-            </a:lnRef>
-            <a:fillRef idx="1">
-              <a:schemeClr val="accent1"/>
-            </a:fillRef>
-            <a:effectRef idx="0">
-              <a:schemeClr val="accent1"/>
-            </a:effectRef>
-            <a:fontRef idx="minor">
-              <a:schemeClr val="lt1"/>
-            </a:fontRef>
-          </p:style>
-          <p:txBody>
-            <a:bodyPr rtlCol="0" anchor="ctr"/>
-            <a:lstStyle/>
-            <a:p>
-              <a:pPr algn="ctr"/>
-              <a:endParaRPr lang="nl-NL"/>
-            </a:p>
-          </p:txBody>
-        </p:sp>
-        <p:sp>
-          <p:nvSpPr>
-            <p:cNvPr id="193" name="Parallelogram 192">
-              <a:extLst>
-                <a:ext uri="{FF2B5EF4-FFF2-40B4-BE49-F238E27FC236}">
-                  <a16:creationId xmlns:a16="http://schemas.microsoft.com/office/drawing/2014/main" id="{02875EBC-B89B-4EA8-849E-0FCFA3ED263F}"/>
-                </a:ext>
-              </a:extLst>
-            </p:cNvPr>
-            <p:cNvSpPr/>
-            <p:nvPr/>
-          </p:nvSpPr>
-          <p:spPr>
-            <a:xfrm rot="5400000">
-              <a:off x="2271838" y="1997834"/>
-              <a:ext cx="634053" cy="390186"/>
-            </a:xfrm>
-            <a:prstGeom prst="parallelogram">
-              <a:avLst>
-                <a:gd name="adj" fmla="val 37500"/>
-              </a:avLst>
-            </a:prstGeom>
-            <a:solidFill>
-              <a:srgbClr val="FF4F4F"/>
-            </a:solidFill>
-            <a:ln w="19050">
-              <a:solidFill>
-                <a:schemeClr val="bg1"/>
-              </a:solidFill>
-            </a:ln>
-          </p:spPr>
-          <p:style>
-            <a:lnRef idx="2">
-              <a:schemeClr val="accent1">
-                <a:shade val="50000"/>
-              </a:schemeClr>
-            </a:lnRef>
-            <a:fillRef idx="1">
-              <a:schemeClr val="accent1"/>
-            </a:fillRef>
-            <a:effectRef idx="0">
-              <a:schemeClr val="accent1"/>
-            </a:effectRef>
-            <a:fontRef idx="minor">
-              <a:schemeClr val="lt1"/>
-            </a:fontRef>
-          </p:style>
-          <p:txBody>
-            <a:bodyPr rtlCol="0" anchor="ctr"/>
-            <a:lstStyle/>
-            <a:p>
-              <a:pPr algn="ctr"/>
-              <a:endParaRPr lang="nl-NL"/>
-            </a:p>
-          </p:txBody>
-        </p:sp>
-        <p:sp>
-          <p:nvSpPr>
-            <p:cNvPr id="194" name="Parallelogram 193">
-              <a:extLst>
-                <a:ext uri="{FF2B5EF4-FFF2-40B4-BE49-F238E27FC236}">
-                  <a16:creationId xmlns:a16="http://schemas.microsoft.com/office/drawing/2014/main" id="{DCFEAC24-C399-486A-98B6-1F553AE45F54}"/>
-                </a:ext>
-              </a:extLst>
-            </p:cNvPr>
-            <p:cNvSpPr/>
-            <p:nvPr/>
-          </p:nvSpPr>
-          <p:spPr>
-            <a:xfrm rot="5400000">
-              <a:off x="2271837" y="2486041"/>
-              <a:ext cx="634053" cy="390186"/>
-            </a:xfrm>
-            <a:prstGeom prst="parallelogram">
-              <a:avLst>
-                <a:gd name="adj" fmla="val 37500"/>
-              </a:avLst>
-            </a:prstGeom>
-            <a:solidFill>
-              <a:srgbClr val="FF4F4F"/>
-            </a:solidFill>
-            <a:ln w="19050">
-              <a:solidFill>
-                <a:schemeClr val="bg1"/>
-              </a:solidFill>
-            </a:ln>
-          </p:spPr>
-          <p:style>
-            <a:lnRef idx="2">
-              <a:schemeClr val="accent1">
-                <a:shade val="50000"/>
-              </a:schemeClr>
-            </a:lnRef>
-            <a:fillRef idx="1">
-              <a:schemeClr val="accent1"/>
-            </a:fillRef>
-            <a:effectRef idx="0">
-              <a:schemeClr val="accent1"/>
-            </a:effectRef>
-            <a:fontRef idx="minor">
-              <a:schemeClr val="lt1"/>
-            </a:fontRef>
-          </p:style>
-          <p:txBody>
-            <a:bodyPr rtlCol="0" anchor="ctr"/>
-            <a:lstStyle/>
-            <a:p>
-              <a:pPr algn="ctr"/>
-              <a:endParaRPr lang="nl-NL"/>
-            </a:p>
-          </p:txBody>
-        </p:sp>
-        <p:sp>
-          <p:nvSpPr>
-            <p:cNvPr id="195" name="Diamond 194">
-              <a:extLst>
-                <a:ext uri="{FF2B5EF4-FFF2-40B4-BE49-F238E27FC236}">
-                  <a16:creationId xmlns:a16="http://schemas.microsoft.com/office/drawing/2014/main" id="{D096D9D9-D9B6-4838-A6E4-08FEA8E11420}"/>
-                </a:ext>
-              </a:extLst>
-            </p:cNvPr>
-            <p:cNvSpPr/>
+            <p:cNvSpPr txBox="1"/>
             <p:nvPr/>
           </p:nvSpPr>
           <p:spPr>
             <a:xfrm>
-              <a:off x="2789440" y="1383612"/>
-              <a:ext cx="780372" cy="292640"/>
+              <a:off x="8344965" y="1767413"/>
+              <a:ext cx="429926" cy="215444"/>
             </a:xfrm>
-            <a:prstGeom prst="diamond">
+            <a:prstGeom prst="rect">
               <a:avLst/>
             </a:prstGeom>
-            <a:solidFill>
-              <a:srgbClr val="FF4F4F"/>
-            </a:solidFill>
-            <a:ln w="19050">
-              <a:solidFill>
-                <a:schemeClr val="bg1"/>
-              </a:solidFill>
-            </a:ln>
+            <a:noFill/>
           </p:spPr>
-          <p:style>
-            <a:lnRef idx="2">
-              <a:schemeClr val="accent1">
-                <a:shade val="50000"/>
-              </a:schemeClr>
-            </a:lnRef>
-            <a:fillRef idx="1">
-              <a:schemeClr val="accent1"/>
-            </a:fillRef>
-            <a:effectRef idx="0">
-              <a:schemeClr val="accent1"/>
-            </a:effectRef>
-            <a:fontRef idx="minor">
-              <a:schemeClr val="lt1"/>
-            </a:fontRef>
-          </p:style>
           <p:txBody>
-            <a:bodyPr rtlCol="0" anchor="ctr"/>
+            <a:bodyPr wrap="none" rtlCol="0">
+              <a:spAutoFit/>
+            </a:bodyPr>
             <a:lstStyle/>
             <a:p>
-              <a:pPr algn="ctr"/>
-              <a:endParaRPr lang="nl-NL"/>
-            </a:p>
-          </p:txBody>
-        </p:sp>
-        <p:sp>
-          <p:nvSpPr>
-            <p:cNvPr id="196" name="Diamond 195">
-              <a:extLst>
-                <a:ext uri="{FF2B5EF4-FFF2-40B4-BE49-F238E27FC236}">
-                  <a16:creationId xmlns:a16="http://schemas.microsoft.com/office/drawing/2014/main" id="{68FE2C22-9D0F-419A-B384-CD365DB17224}"/>
-                </a:ext>
-              </a:extLst>
-            </p:cNvPr>
-            <p:cNvSpPr/>
-            <p:nvPr/>
-          </p:nvSpPr>
-          <p:spPr>
-            <a:xfrm>
-              <a:off x="2400027" y="1237911"/>
-              <a:ext cx="780372" cy="292640"/>
-            </a:xfrm>
-            <a:prstGeom prst="diamond">
-              <a:avLst/>
-            </a:prstGeom>
-            <a:solidFill>
-              <a:srgbClr val="FF4F4F"/>
-            </a:solidFill>
-            <a:ln w="19050">
-              <a:solidFill>
-                <a:schemeClr val="bg1"/>
-              </a:solidFill>
-            </a:ln>
-          </p:spPr>
-          <p:style>
-            <a:lnRef idx="2">
-              <a:schemeClr val="accent1">
-                <a:shade val="50000"/>
-              </a:schemeClr>
-            </a:lnRef>
-            <a:fillRef idx="1">
-              <a:schemeClr val="accent1"/>
-            </a:fillRef>
-            <a:effectRef idx="0">
-              <a:schemeClr val="accent1"/>
-            </a:effectRef>
-            <a:fontRef idx="minor">
-              <a:schemeClr val="lt1"/>
-            </a:fontRef>
-          </p:style>
-          <p:txBody>
-            <a:bodyPr rtlCol="0" anchor="ctr"/>
-            <a:lstStyle/>
-            <a:p>
-              <a:pPr algn="ctr"/>
-              <a:endParaRPr lang="nl-NL"/>
-            </a:p>
-          </p:txBody>
-        </p:sp>
-        <p:sp>
-          <p:nvSpPr>
-            <p:cNvPr id="197" name="Parallelogram 196">
-              <a:extLst>
-                <a:ext uri="{FF2B5EF4-FFF2-40B4-BE49-F238E27FC236}">
-                  <a16:creationId xmlns:a16="http://schemas.microsoft.com/office/drawing/2014/main" id="{18C35CA5-FEC2-407C-B049-3B4A75781775}"/>
-                </a:ext>
-              </a:extLst>
-            </p:cNvPr>
-            <p:cNvSpPr/>
-            <p:nvPr/>
-          </p:nvSpPr>
-          <p:spPr>
-            <a:xfrm rot="5400000" flipV="1">
-              <a:off x="3832594" y="1655947"/>
-              <a:ext cx="634053" cy="390186"/>
-            </a:xfrm>
-            <a:prstGeom prst="parallelogram">
-              <a:avLst>
-                <a:gd name="adj" fmla="val 37500"/>
-              </a:avLst>
-            </a:prstGeom>
-            <a:solidFill>
-              <a:srgbClr val="FF4F4F"/>
-            </a:solidFill>
-            <a:ln w="19050">
-              <a:solidFill>
-                <a:schemeClr val="bg1"/>
-              </a:solidFill>
-            </a:ln>
-          </p:spPr>
-          <p:style>
-            <a:lnRef idx="2">
-              <a:schemeClr val="accent1">
-                <a:shade val="50000"/>
-              </a:schemeClr>
-            </a:lnRef>
-            <a:fillRef idx="1">
-              <a:schemeClr val="accent1"/>
-            </a:fillRef>
-            <a:effectRef idx="0">
-              <a:schemeClr val="accent1"/>
-            </a:effectRef>
-            <a:fontRef idx="minor">
-              <a:schemeClr val="lt1"/>
-            </a:fontRef>
-          </p:style>
-          <p:txBody>
-            <a:bodyPr rtlCol="0" anchor="ctr"/>
-            <a:lstStyle/>
-            <a:p>
-              <a:pPr algn="ctr"/>
-              <a:endParaRPr lang="nl-NL"/>
-            </a:p>
-          </p:txBody>
-        </p:sp>
-        <p:sp>
-          <p:nvSpPr>
-            <p:cNvPr id="198" name="Parallelogram 197">
-              <a:extLst>
-                <a:ext uri="{FF2B5EF4-FFF2-40B4-BE49-F238E27FC236}">
-                  <a16:creationId xmlns:a16="http://schemas.microsoft.com/office/drawing/2014/main" id="{C8D51382-84B4-41DB-9D6E-CE6A4DA09533}"/>
-                </a:ext>
-              </a:extLst>
-            </p:cNvPr>
-            <p:cNvSpPr/>
-            <p:nvPr/>
-          </p:nvSpPr>
-          <p:spPr>
-            <a:xfrm rot="5400000" flipV="1">
-              <a:off x="3832594" y="2144154"/>
-              <a:ext cx="634053" cy="390186"/>
-            </a:xfrm>
-            <a:prstGeom prst="parallelogram">
-              <a:avLst>
-                <a:gd name="adj" fmla="val 37500"/>
-              </a:avLst>
-            </a:prstGeom>
-            <a:solidFill>
-              <a:srgbClr val="FF4F4F"/>
-            </a:solidFill>
-            <a:ln w="19050">
-              <a:solidFill>
-                <a:schemeClr val="bg1"/>
-              </a:solidFill>
-            </a:ln>
-          </p:spPr>
-          <p:style>
-            <a:lnRef idx="2">
-              <a:schemeClr val="accent1">
-                <a:shade val="50000"/>
-              </a:schemeClr>
-            </a:lnRef>
-            <a:fillRef idx="1">
-              <a:schemeClr val="accent1"/>
-            </a:fillRef>
-            <a:effectRef idx="0">
-              <a:schemeClr val="accent1"/>
-            </a:effectRef>
-            <a:fontRef idx="minor">
-              <a:schemeClr val="lt1"/>
-            </a:fontRef>
-          </p:style>
-          <p:txBody>
-            <a:bodyPr rtlCol="0" anchor="ctr"/>
-            <a:lstStyle/>
-            <a:p>
-              <a:pPr algn="ctr"/>
-              <a:endParaRPr lang="nl-NL"/>
-            </a:p>
-          </p:txBody>
-        </p:sp>
-        <p:sp>
-          <p:nvSpPr>
-            <p:cNvPr id="199" name="Parallelogram 198">
-              <a:extLst>
-                <a:ext uri="{FF2B5EF4-FFF2-40B4-BE49-F238E27FC236}">
-                  <a16:creationId xmlns:a16="http://schemas.microsoft.com/office/drawing/2014/main" id="{B0EB9E08-FE77-45A8-AB53-5D50061CFD8B}"/>
-                </a:ext>
-              </a:extLst>
-            </p:cNvPr>
-            <p:cNvSpPr/>
-            <p:nvPr/>
-          </p:nvSpPr>
-          <p:spPr>
-            <a:xfrm rot="5400000" flipV="1">
-              <a:off x="3832594" y="2631887"/>
-              <a:ext cx="634053" cy="390186"/>
-            </a:xfrm>
-            <a:prstGeom prst="parallelogram">
-              <a:avLst>
-                <a:gd name="adj" fmla="val 37500"/>
-              </a:avLst>
-            </a:prstGeom>
-            <a:solidFill>
-              <a:srgbClr val="FF4F4F"/>
-            </a:solidFill>
-            <a:ln w="19050">
-              <a:solidFill>
-                <a:schemeClr val="bg1"/>
-              </a:solidFill>
-            </a:ln>
-          </p:spPr>
-          <p:style>
-            <a:lnRef idx="2">
-              <a:schemeClr val="accent1">
-                <a:shade val="50000"/>
-              </a:schemeClr>
-            </a:lnRef>
-            <a:fillRef idx="1">
-              <a:schemeClr val="accent1"/>
-            </a:fillRef>
-            <a:effectRef idx="0">
-              <a:schemeClr val="accent1"/>
-            </a:effectRef>
-            <a:fontRef idx="minor">
-              <a:schemeClr val="lt1"/>
-            </a:fontRef>
-          </p:style>
-          <p:txBody>
-            <a:bodyPr rtlCol="0" anchor="ctr"/>
-            <a:lstStyle/>
-            <a:p>
-              <a:pPr algn="ctr"/>
-              <a:endParaRPr lang="nl-NL"/>
-            </a:p>
-          </p:txBody>
-        </p:sp>
-        <p:sp>
-          <p:nvSpPr>
-            <p:cNvPr id="200" name="Diamond 199">
-              <a:extLst>
-                <a:ext uri="{FF2B5EF4-FFF2-40B4-BE49-F238E27FC236}">
-                  <a16:creationId xmlns:a16="http://schemas.microsoft.com/office/drawing/2014/main" id="{51E429C8-30E8-4BA4-A0A7-CB8BF1A31155}"/>
-                </a:ext>
-              </a:extLst>
-            </p:cNvPr>
-            <p:cNvSpPr/>
-            <p:nvPr/>
-          </p:nvSpPr>
-          <p:spPr>
-            <a:xfrm>
-              <a:off x="3560424" y="1383447"/>
-              <a:ext cx="780372" cy="292640"/>
-            </a:xfrm>
-            <a:prstGeom prst="diamond">
-              <a:avLst/>
-            </a:prstGeom>
-            <a:solidFill>
-              <a:srgbClr val="FF4F4F"/>
-            </a:solidFill>
-            <a:ln w="19050">
-              <a:solidFill>
-                <a:schemeClr val="bg1"/>
-              </a:solidFill>
-            </a:ln>
-          </p:spPr>
-          <p:style>
-            <a:lnRef idx="2">
-              <a:schemeClr val="accent1">
-                <a:shade val="50000"/>
-              </a:schemeClr>
-            </a:lnRef>
-            <a:fillRef idx="1">
-              <a:schemeClr val="accent1"/>
-            </a:fillRef>
-            <a:effectRef idx="0">
-              <a:schemeClr val="accent1"/>
-            </a:effectRef>
-            <a:fontRef idx="minor">
-              <a:schemeClr val="lt1"/>
-            </a:fontRef>
-          </p:style>
-          <p:txBody>
-            <a:bodyPr rtlCol="0" anchor="ctr"/>
-            <a:lstStyle/>
-            <a:p>
-              <a:pPr algn="ctr"/>
-              <a:endParaRPr lang="nl-NL"/>
-            </a:p>
-          </p:txBody>
-        </p:sp>
-        <p:sp>
-          <p:nvSpPr>
-            <p:cNvPr id="201" name="Diamond 200">
-              <a:extLst>
-                <a:ext uri="{FF2B5EF4-FFF2-40B4-BE49-F238E27FC236}">
-                  <a16:creationId xmlns:a16="http://schemas.microsoft.com/office/drawing/2014/main" id="{D990F958-D26E-4DE7-9A29-8AC93AA771C0}"/>
-                </a:ext>
-              </a:extLst>
-            </p:cNvPr>
-            <p:cNvSpPr/>
-            <p:nvPr/>
-          </p:nvSpPr>
-          <p:spPr>
-            <a:xfrm>
-              <a:off x="3174142" y="1238529"/>
-              <a:ext cx="780372" cy="292640"/>
-            </a:xfrm>
-            <a:prstGeom prst="diamond">
-              <a:avLst/>
-            </a:prstGeom>
-            <a:solidFill>
-              <a:srgbClr val="FF4F4F"/>
-            </a:solidFill>
-            <a:ln w="19050">
-              <a:solidFill>
-                <a:schemeClr val="bg1"/>
-              </a:solidFill>
-            </a:ln>
-          </p:spPr>
-          <p:style>
-            <a:lnRef idx="2">
-              <a:schemeClr val="accent1">
-                <a:shade val="50000"/>
-              </a:schemeClr>
-            </a:lnRef>
-            <a:fillRef idx="1">
-              <a:schemeClr val="accent1"/>
-            </a:fillRef>
-            <a:effectRef idx="0">
-              <a:schemeClr val="accent1"/>
-            </a:effectRef>
-            <a:fontRef idx="minor">
-              <a:schemeClr val="lt1"/>
-            </a:fontRef>
-          </p:style>
-          <p:txBody>
-            <a:bodyPr rtlCol="0" anchor="ctr"/>
-            <a:lstStyle/>
-            <a:p>
-              <a:pPr algn="ctr"/>
-              <a:endParaRPr lang="nl-NL"/>
-            </a:p>
-          </p:txBody>
-        </p:sp>
-        <p:sp>
-          <p:nvSpPr>
-            <p:cNvPr id="202" name="Diamond 201">
-              <a:extLst>
-                <a:ext uri="{FF2B5EF4-FFF2-40B4-BE49-F238E27FC236}">
-                  <a16:creationId xmlns:a16="http://schemas.microsoft.com/office/drawing/2014/main" id="{BB912074-E9A6-4A21-A52A-3988F42EC54C}"/>
-                </a:ext>
-              </a:extLst>
-            </p:cNvPr>
-            <p:cNvSpPr/>
-            <p:nvPr/>
-          </p:nvSpPr>
-          <p:spPr>
-            <a:xfrm>
-              <a:off x="2788593" y="1091899"/>
-              <a:ext cx="780372" cy="292640"/>
-            </a:xfrm>
-            <a:prstGeom prst="diamond">
-              <a:avLst/>
-            </a:prstGeom>
-            <a:solidFill>
-              <a:srgbClr val="FF4F4F"/>
-            </a:solidFill>
-            <a:ln w="19050">
-              <a:solidFill>
-                <a:schemeClr val="bg1"/>
-              </a:solidFill>
-            </a:ln>
-          </p:spPr>
-          <p:style>
-            <a:lnRef idx="2">
-              <a:schemeClr val="accent1">
-                <a:shade val="50000"/>
-              </a:schemeClr>
-            </a:lnRef>
-            <a:fillRef idx="1">
-              <a:schemeClr val="accent1"/>
-            </a:fillRef>
-            <a:effectRef idx="0">
-              <a:schemeClr val="accent1"/>
-            </a:effectRef>
-            <a:fontRef idx="minor">
-              <a:schemeClr val="lt1"/>
-            </a:fontRef>
-          </p:style>
-          <p:txBody>
-            <a:bodyPr rtlCol="0" anchor="ctr"/>
-            <a:lstStyle/>
-            <a:p>
-              <a:pPr algn="ctr"/>
-              <a:endParaRPr lang="nl-NL"/>
-            </a:p>
-          </p:txBody>
-        </p:sp>
-        <p:sp>
-          <p:nvSpPr>
-            <p:cNvPr id="203" name="Parallelogram 202">
-              <a:extLst>
-                <a:ext uri="{FF2B5EF4-FFF2-40B4-BE49-F238E27FC236}">
-                  <a16:creationId xmlns:a16="http://schemas.microsoft.com/office/drawing/2014/main" id="{7929DD32-0F70-4FC7-BBAC-A3B8A1D1ABBA}"/>
-                </a:ext>
-              </a:extLst>
-            </p:cNvPr>
-            <p:cNvSpPr/>
-            <p:nvPr/>
-          </p:nvSpPr>
-          <p:spPr>
-            <a:xfrm rot="5400000" flipV="1">
-              <a:off x="4222780" y="1509627"/>
-              <a:ext cx="634053" cy="390186"/>
-            </a:xfrm>
-            <a:prstGeom prst="parallelogram">
-              <a:avLst>
-                <a:gd name="adj" fmla="val 37500"/>
-              </a:avLst>
-            </a:prstGeom>
-            <a:solidFill>
-              <a:srgbClr val="FF4F4F"/>
-            </a:solidFill>
-            <a:ln w="19050">
-              <a:solidFill>
-                <a:schemeClr val="bg1"/>
-              </a:solidFill>
-            </a:ln>
-          </p:spPr>
-          <p:style>
-            <a:lnRef idx="2">
-              <a:schemeClr val="accent1">
-                <a:shade val="50000"/>
-              </a:schemeClr>
-            </a:lnRef>
-            <a:fillRef idx="1">
-              <a:schemeClr val="accent1"/>
-            </a:fillRef>
-            <a:effectRef idx="0">
-              <a:schemeClr val="accent1"/>
-            </a:effectRef>
-            <a:fontRef idx="minor">
-              <a:schemeClr val="lt1"/>
-            </a:fontRef>
-          </p:style>
-          <p:txBody>
-            <a:bodyPr rtlCol="0" anchor="ctr"/>
-            <a:lstStyle/>
-            <a:p>
-              <a:pPr algn="ctr"/>
-              <a:endParaRPr lang="nl-NL"/>
-            </a:p>
-          </p:txBody>
-        </p:sp>
-        <p:sp>
-          <p:nvSpPr>
-            <p:cNvPr id="204" name="Parallelogram 203">
-              <a:extLst>
-                <a:ext uri="{FF2B5EF4-FFF2-40B4-BE49-F238E27FC236}">
-                  <a16:creationId xmlns:a16="http://schemas.microsoft.com/office/drawing/2014/main" id="{6A1F5B0F-67E4-4C90-82C1-0ABB61AE534C}"/>
-                </a:ext>
-              </a:extLst>
-            </p:cNvPr>
-            <p:cNvSpPr/>
-            <p:nvPr/>
-          </p:nvSpPr>
-          <p:spPr>
-            <a:xfrm rot="5400000" flipV="1">
-              <a:off x="4222780" y="1997834"/>
-              <a:ext cx="634053" cy="390186"/>
-            </a:xfrm>
-            <a:prstGeom prst="parallelogram">
-              <a:avLst>
-                <a:gd name="adj" fmla="val 37500"/>
-              </a:avLst>
-            </a:prstGeom>
-            <a:solidFill>
-              <a:srgbClr val="FF4F4F"/>
-            </a:solidFill>
-            <a:ln w="19050">
-              <a:solidFill>
-                <a:schemeClr val="bg1"/>
-              </a:solidFill>
-            </a:ln>
-          </p:spPr>
-          <p:style>
-            <a:lnRef idx="2">
-              <a:schemeClr val="accent1">
-                <a:shade val="50000"/>
-              </a:schemeClr>
-            </a:lnRef>
-            <a:fillRef idx="1">
-              <a:schemeClr val="accent1"/>
-            </a:fillRef>
-            <a:effectRef idx="0">
-              <a:schemeClr val="accent1"/>
-            </a:effectRef>
-            <a:fontRef idx="minor">
-              <a:schemeClr val="lt1"/>
-            </a:fontRef>
-          </p:style>
-          <p:txBody>
-            <a:bodyPr rtlCol="0" anchor="ctr"/>
-            <a:lstStyle/>
-            <a:p>
-              <a:pPr algn="ctr"/>
-              <a:endParaRPr lang="nl-NL"/>
-            </a:p>
-          </p:txBody>
-        </p:sp>
-        <p:sp>
-          <p:nvSpPr>
-            <p:cNvPr id="205" name="Parallelogram 204">
-              <a:extLst>
-                <a:ext uri="{FF2B5EF4-FFF2-40B4-BE49-F238E27FC236}">
-                  <a16:creationId xmlns:a16="http://schemas.microsoft.com/office/drawing/2014/main" id="{AFC9397F-F87A-4D63-8FD5-9AB0E9986B23}"/>
-                </a:ext>
-              </a:extLst>
-            </p:cNvPr>
-            <p:cNvSpPr/>
-            <p:nvPr/>
-          </p:nvSpPr>
-          <p:spPr>
-            <a:xfrm rot="5400000" flipV="1">
-              <a:off x="4222780" y="2485566"/>
-              <a:ext cx="634053" cy="390186"/>
-            </a:xfrm>
-            <a:prstGeom prst="parallelogram">
-              <a:avLst>
-                <a:gd name="adj" fmla="val 37500"/>
-              </a:avLst>
-            </a:prstGeom>
-            <a:solidFill>
-              <a:srgbClr val="FF4F4F"/>
-            </a:solidFill>
-            <a:ln w="19050">
-              <a:solidFill>
-                <a:schemeClr val="bg1"/>
-              </a:solidFill>
-            </a:ln>
-          </p:spPr>
-          <p:style>
-            <a:lnRef idx="2">
-              <a:schemeClr val="accent1">
-                <a:shade val="50000"/>
-              </a:schemeClr>
-            </a:lnRef>
-            <a:fillRef idx="1">
-              <a:schemeClr val="accent1"/>
-            </a:fillRef>
-            <a:effectRef idx="0">
-              <a:schemeClr val="accent1"/>
-            </a:effectRef>
-            <a:fontRef idx="minor">
-              <a:schemeClr val="lt1"/>
-            </a:fontRef>
-          </p:style>
-          <p:txBody>
-            <a:bodyPr rtlCol="0" anchor="ctr"/>
-            <a:lstStyle/>
-            <a:p>
-              <a:pPr algn="ctr"/>
-              <a:endParaRPr lang="nl-NL"/>
-            </a:p>
-          </p:txBody>
-        </p:sp>
-        <p:sp>
-          <p:nvSpPr>
-            <p:cNvPr id="206" name="Diamond 205">
-              <a:extLst>
-                <a:ext uri="{FF2B5EF4-FFF2-40B4-BE49-F238E27FC236}">
-                  <a16:creationId xmlns:a16="http://schemas.microsoft.com/office/drawing/2014/main" id="{AE3AC575-3B7C-4673-9391-F16269D4B7A5}"/>
-                </a:ext>
-              </a:extLst>
-            </p:cNvPr>
-            <p:cNvSpPr/>
-            <p:nvPr/>
-          </p:nvSpPr>
-          <p:spPr>
-            <a:xfrm>
-              <a:off x="3950747" y="1237148"/>
-              <a:ext cx="780372" cy="292640"/>
-            </a:xfrm>
-            <a:prstGeom prst="diamond">
-              <a:avLst/>
-            </a:prstGeom>
-            <a:solidFill>
-              <a:srgbClr val="FF4F4F"/>
-            </a:solidFill>
-            <a:ln w="19050">
-              <a:solidFill>
-                <a:schemeClr val="bg1"/>
-              </a:solidFill>
-            </a:ln>
-          </p:spPr>
-          <p:style>
-            <a:lnRef idx="2">
-              <a:schemeClr val="accent1">
-                <a:shade val="50000"/>
-              </a:schemeClr>
-            </a:lnRef>
-            <a:fillRef idx="1">
-              <a:schemeClr val="accent1"/>
-            </a:fillRef>
-            <a:effectRef idx="0">
-              <a:schemeClr val="accent1"/>
-            </a:effectRef>
-            <a:fontRef idx="minor">
-              <a:schemeClr val="lt1"/>
-            </a:fontRef>
-          </p:style>
-          <p:txBody>
-            <a:bodyPr rtlCol="0" anchor="ctr"/>
-            <a:lstStyle/>
-            <a:p>
-              <a:pPr algn="ctr"/>
-              <a:endParaRPr lang="nl-NL"/>
-            </a:p>
-          </p:txBody>
-        </p:sp>
-        <p:sp>
-          <p:nvSpPr>
-            <p:cNvPr id="207" name="Diamond 206">
-              <a:extLst>
-                <a:ext uri="{FF2B5EF4-FFF2-40B4-BE49-F238E27FC236}">
-                  <a16:creationId xmlns:a16="http://schemas.microsoft.com/office/drawing/2014/main" id="{C89537B0-315F-4A6E-9058-7546A9B7D425}"/>
-                </a:ext>
-              </a:extLst>
-            </p:cNvPr>
-            <p:cNvSpPr/>
-            <p:nvPr/>
-          </p:nvSpPr>
-          <p:spPr>
-            <a:xfrm>
-              <a:off x="3564134" y="1092374"/>
-              <a:ext cx="780372" cy="292640"/>
-            </a:xfrm>
-            <a:prstGeom prst="diamond">
-              <a:avLst/>
-            </a:prstGeom>
-            <a:solidFill>
-              <a:srgbClr val="FF4F4F"/>
-            </a:solidFill>
-            <a:ln w="19050">
-              <a:solidFill>
-                <a:schemeClr val="bg1"/>
-              </a:solidFill>
-            </a:ln>
-          </p:spPr>
-          <p:style>
-            <a:lnRef idx="2">
-              <a:schemeClr val="accent1">
-                <a:shade val="50000"/>
-              </a:schemeClr>
-            </a:lnRef>
-            <a:fillRef idx="1">
-              <a:schemeClr val="accent1"/>
-            </a:fillRef>
-            <a:effectRef idx="0">
-              <a:schemeClr val="accent1"/>
-            </a:effectRef>
-            <a:fontRef idx="minor">
-              <a:schemeClr val="lt1"/>
-            </a:fontRef>
-          </p:style>
-          <p:txBody>
-            <a:bodyPr rtlCol="0" anchor="ctr"/>
-            <a:lstStyle/>
-            <a:p>
-              <a:pPr algn="ctr"/>
-              <a:endParaRPr lang="nl-NL"/>
-            </a:p>
-          </p:txBody>
-        </p:sp>
-        <p:sp>
-          <p:nvSpPr>
-            <p:cNvPr id="208" name="Diamond 207">
-              <a:extLst>
-                <a:ext uri="{FF2B5EF4-FFF2-40B4-BE49-F238E27FC236}">
-                  <a16:creationId xmlns:a16="http://schemas.microsoft.com/office/drawing/2014/main" id="{FE25E567-5F61-4F6A-B9B0-1E8B024860D9}"/>
-                </a:ext>
-              </a:extLst>
-            </p:cNvPr>
-            <p:cNvSpPr/>
-            <p:nvPr/>
-          </p:nvSpPr>
-          <p:spPr>
-            <a:xfrm>
-              <a:off x="3174796" y="946033"/>
-              <a:ext cx="780372" cy="292640"/>
-            </a:xfrm>
-            <a:prstGeom prst="diamond">
-              <a:avLst/>
-            </a:prstGeom>
-            <a:solidFill>
-              <a:srgbClr val="FF4F4F"/>
-            </a:solidFill>
-            <a:ln w="19050">
-              <a:solidFill>
-                <a:schemeClr val="bg1"/>
-              </a:solidFill>
-            </a:ln>
-          </p:spPr>
-          <p:style>
-            <a:lnRef idx="2">
-              <a:schemeClr val="accent1">
-                <a:shade val="50000"/>
-              </a:schemeClr>
-            </a:lnRef>
-            <a:fillRef idx="1">
-              <a:schemeClr val="accent1"/>
-            </a:fillRef>
-            <a:effectRef idx="0">
-              <a:schemeClr val="accent1"/>
-            </a:effectRef>
-            <a:fontRef idx="minor">
-              <a:schemeClr val="lt1"/>
-            </a:fontRef>
-          </p:style>
-          <p:txBody>
-            <a:bodyPr rtlCol="0" anchor="ctr"/>
-            <a:lstStyle/>
-            <a:p>
-              <a:pPr algn="ctr"/>
-              <a:endParaRPr lang="nl-NL"/>
-            </a:p>
-          </p:txBody>
-        </p:sp>
-      </p:grpSp>
-      <p:sp>
-        <p:nvSpPr>
-          <p:cNvPr id="215" name="TextBox 214">
-            <a:extLst>
-              <a:ext uri="{FF2B5EF4-FFF2-40B4-BE49-F238E27FC236}">
-                <a16:creationId xmlns:a16="http://schemas.microsoft.com/office/drawing/2014/main" id="{70CD4ADC-7275-4D1C-9FC7-2F333635B4E0}"/>
-              </a:ext>
-            </a:extLst>
-          </p:cNvPr>
-          <p:cNvSpPr txBox="1"/>
-          <p:nvPr/>
-        </p:nvSpPr>
-        <p:spPr>
-          <a:xfrm>
-            <a:off x="9789557" y="2815053"/>
-            <a:ext cx="564578" cy="215444"/>
-          </a:xfrm>
-          <a:prstGeom prst="rect">
-            <a:avLst/>
-          </a:prstGeom>
-          <a:noFill/>
-        </p:spPr>
-        <p:txBody>
-          <a:bodyPr wrap="none" rtlCol="0">
-            <a:spAutoFit/>
-          </a:bodyPr>
-          <a:lstStyle/>
-          <a:p>
-            <a:r>
-              <a:rPr lang="en-GB" sz="800" b="1" dirty="0">
+              <a:r>
+                <a:rPr lang="en-GB" sz="800" b="1" dirty="0">
+                  <a:solidFill>
+                    <a:schemeClr val="bg2">
+                      <a:lumMod val="50000"/>
+                    </a:schemeClr>
+                  </a:solidFill>
+                </a:rPr>
+                <a:t>Japan</a:t>
+              </a:r>
+              <a:endParaRPr lang="nl-NL" b="1" dirty="0">
                 <a:solidFill>
                   <a:schemeClr val="bg2">
                     <a:lumMod val="50000"/>
                   </a:schemeClr>
                 </a:solidFill>
-              </a:rPr>
-              <a:t>February</a:t>
-            </a:r>
-            <a:endParaRPr lang="nl-NL" b="1" dirty="0">
-              <a:solidFill>
-                <a:schemeClr val="bg2">
-                  <a:lumMod val="50000"/>
-                </a:schemeClr>
-              </a:solidFill>
-            </a:endParaRPr>
-          </a:p>
-        </p:txBody>
-      </p:sp>
-      <p:sp>
-        <p:nvSpPr>
-          <p:cNvPr id="216" name="TextBox 215">
-            <a:extLst>
-              <a:ext uri="{FF2B5EF4-FFF2-40B4-BE49-F238E27FC236}">
-                <a16:creationId xmlns:a16="http://schemas.microsoft.com/office/drawing/2014/main" id="{8ABE965A-DEF6-4994-9B4E-D329F8302AAC}"/>
-              </a:ext>
-            </a:extLst>
-          </p:cNvPr>
-          <p:cNvSpPr txBox="1"/>
-          <p:nvPr/>
-        </p:nvSpPr>
-        <p:spPr>
-          <a:xfrm>
-            <a:off x="10040483" y="2719324"/>
-            <a:ext cx="460382" cy="215444"/>
-          </a:xfrm>
-          <a:prstGeom prst="rect">
-            <a:avLst/>
-          </a:prstGeom>
-          <a:noFill/>
-        </p:spPr>
-        <p:txBody>
-          <a:bodyPr wrap="none" rtlCol="0">
-            <a:spAutoFit/>
-          </a:bodyPr>
-          <a:lstStyle/>
-          <a:p>
-            <a:r>
-              <a:rPr lang="en-GB" sz="800" b="1" dirty="0">
-                <a:solidFill>
-                  <a:schemeClr val="bg2">
-                    <a:lumMod val="50000"/>
-                  </a:schemeClr>
-                </a:solidFill>
-              </a:rPr>
-              <a:t>March</a:t>
-            </a:r>
-            <a:endParaRPr lang="nl-NL" b="1" dirty="0">
-              <a:solidFill>
-                <a:schemeClr val="bg2">
-                  <a:lumMod val="50000"/>
-                </a:schemeClr>
-              </a:solidFill>
-            </a:endParaRPr>
-          </a:p>
-        </p:txBody>
-      </p:sp>
-      <p:sp>
-        <p:nvSpPr>
-          <p:cNvPr id="219" name="TextBox 218">
-            <a:extLst>
-              <a:ext uri="{FF2B5EF4-FFF2-40B4-BE49-F238E27FC236}">
-                <a16:creationId xmlns:a16="http://schemas.microsoft.com/office/drawing/2014/main" id="{B9910D21-EE82-4052-A9FD-58F9F9002C75}"/>
-              </a:ext>
-            </a:extLst>
-          </p:cNvPr>
-          <p:cNvSpPr txBox="1"/>
-          <p:nvPr/>
-        </p:nvSpPr>
-        <p:spPr>
-          <a:xfrm>
-            <a:off x="8697322" y="2796592"/>
-            <a:ext cx="604653" cy="215444"/>
-          </a:xfrm>
-          <a:prstGeom prst="rect">
-            <a:avLst/>
-          </a:prstGeom>
-          <a:noFill/>
-        </p:spPr>
-        <p:txBody>
-          <a:bodyPr wrap="none" rtlCol="0">
-            <a:spAutoFit/>
-          </a:bodyPr>
-          <a:lstStyle/>
-          <a:p>
-            <a:r>
-              <a:rPr lang="en-GB" sz="800" b="1" dirty="0">
-                <a:solidFill>
-                  <a:schemeClr val="bg2">
-                    <a:lumMod val="50000"/>
-                  </a:schemeClr>
-                </a:solidFill>
-              </a:rPr>
-              <a:t>Mountain</a:t>
-            </a:r>
-            <a:endParaRPr lang="nl-NL" b="1" dirty="0">
-              <a:solidFill>
-                <a:schemeClr val="bg2">
-                  <a:lumMod val="50000"/>
-                </a:schemeClr>
-              </a:solidFill>
-            </a:endParaRPr>
-          </a:p>
-        </p:txBody>
-      </p:sp>
-      <p:sp>
-        <p:nvSpPr>
-          <p:cNvPr id="220" name="TextBox 219">
-            <a:extLst>
-              <a:ext uri="{FF2B5EF4-FFF2-40B4-BE49-F238E27FC236}">
-                <a16:creationId xmlns:a16="http://schemas.microsoft.com/office/drawing/2014/main" id="{89262747-5F30-4635-9C1F-4E13BB29DD79}"/>
-              </a:ext>
-            </a:extLst>
-          </p:cNvPr>
-          <p:cNvSpPr txBox="1"/>
-          <p:nvPr/>
-        </p:nvSpPr>
-        <p:spPr>
-          <a:xfrm>
-            <a:off x="8620657" y="2704007"/>
-            <a:ext cx="388248" cy="215444"/>
-          </a:xfrm>
-          <a:prstGeom prst="rect">
-            <a:avLst/>
-          </a:prstGeom>
-          <a:noFill/>
-        </p:spPr>
-        <p:txBody>
-          <a:bodyPr wrap="none" rtlCol="0">
-            <a:spAutoFit/>
-          </a:bodyPr>
-          <a:lstStyle/>
-          <a:p>
-            <a:r>
-              <a:rPr lang="en-GB" sz="800" b="1" dirty="0">
-                <a:solidFill>
-                  <a:schemeClr val="bg2">
-                    <a:lumMod val="50000"/>
-                  </a:schemeClr>
-                </a:solidFill>
-              </a:rPr>
-              <a:t>BMX</a:t>
-            </a:r>
-            <a:endParaRPr lang="nl-NL" b="1" dirty="0">
-              <a:solidFill>
-                <a:schemeClr val="bg2">
-                  <a:lumMod val="50000"/>
-                </a:schemeClr>
-              </a:solidFill>
-            </a:endParaRPr>
-          </a:p>
-        </p:txBody>
-      </p:sp>
-      <p:cxnSp>
-        <p:nvCxnSpPr>
-          <p:cNvPr id="221" name="Straight Arrow Connector 220">
-            <a:extLst>
-              <a:ext uri="{FF2B5EF4-FFF2-40B4-BE49-F238E27FC236}">
-                <a16:creationId xmlns:a16="http://schemas.microsoft.com/office/drawing/2014/main" id="{03C4B0AE-B23C-4358-AD68-106860A17B26}"/>
-              </a:ext>
-            </a:extLst>
-          </p:cNvPr>
-          <p:cNvCxnSpPr>
-            <a:cxnSpLocks/>
-          </p:cNvCxnSpPr>
-          <p:nvPr/>
-        </p:nvCxnSpPr>
-        <p:spPr>
-          <a:xfrm flipV="1">
-            <a:off x="8754780" y="1880262"/>
-            <a:ext cx="0" cy="302684"/>
-          </a:xfrm>
-          <a:prstGeom prst="straightConnector1">
-            <a:avLst/>
-          </a:prstGeom>
-          <a:ln w="19050" cap="rnd">
-            <a:solidFill>
-              <a:schemeClr val="bg2">
-                <a:lumMod val="50000"/>
-              </a:schemeClr>
-            </a:solidFill>
-            <a:bevel/>
-            <a:headEnd type="oval" w="sm" len="med"/>
-            <a:tailEnd type="oval" w="sm" len="med"/>
-          </a:ln>
-        </p:spPr>
-        <p:style>
-          <a:lnRef idx="1">
-            <a:schemeClr val="accent1"/>
-          </a:lnRef>
-          <a:fillRef idx="0">
-            <a:schemeClr val="accent1"/>
-          </a:fillRef>
-          <a:effectRef idx="0">
-            <a:schemeClr val="accent1"/>
-          </a:effectRef>
-          <a:fontRef idx="minor">
-            <a:schemeClr val="tx1"/>
-          </a:fontRef>
-        </p:style>
-      </p:cxnSp>
-      <p:cxnSp>
-        <p:nvCxnSpPr>
-          <p:cNvPr id="222" name="Straight Arrow Connector 221">
-            <a:extLst>
-              <a:ext uri="{FF2B5EF4-FFF2-40B4-BE49-F238E27FC236}">
-                <a16:creationId xmlns:a16="http://schemas.microsoft.com/office/drawing/2014/main" id="{CD656F19-B6EC-4304-A73C-7C8158C76B40}"/>
-              </a:ext>
-            </a:extLst>
-          </p:cNvPr>
-          <p:cNvCxnSpPr>
-            <a:cxnSpLocks/>
-          </p:cNvCxnSpPr>
-          <p:nvPr/>
-        </p:nvCxnSpPr>
-        <p:spPr>
-          <a:xfrm flipV="1">
-            <a:off x="8754780" y="2157546"/>
-            <a:ext cx="0" cy="315383"/>
-          </a:xfrm>
-          <a:prstGeom prst="straightConnector1">
-            <a:avLst/>
-          </a:prstGeom>
-          <a:ln w="19050" cap="rnd">
-            <a:solidFill>
-              <a:schemeClr val="bg2">
-                <a:lumMod val="50000"/>
-              </a:schemeClr>
-            </a:solidFill>
-            <a:bevel/>
-            <a:headEnd type="oval" w="sm" len="med"/>
-            <a:tailEnd type="none"/>
-          </a:ln>
-        </p:spPr>
-        <p:style>
-          <a:lnRef idx="1">
-            <a:schemeClr val="accent1"/>
-          </a:lnRef>
-          <a:fillRef idx="0">
-            <a:schemeClr val="accent1"/>
-          </a:fillRef>
-          <a:effectRef idx="0">
-            <a:schemeClr val="accent1"/>
-          </a:effectRef>
-          <a:fontRef idx="minor">
-            <a:schemeClr val="tx1"/>
-          </a:fontRef>
-        </p:style>
-      </p:cxnSp>
-      <p:sp>
-        <p:nvSpPr>
-          <p:cNvPr id="228" name="TextBox 227">
-            <a:extLst>
-              <a:ext uri="{FF2B5EF4-FFF2-40B4-BE49-F238E27FC236}">
-                <a16:creationId xmlns:a16="http://schemas.microsoft.com/office/drawing/2014/main" id="{3D239D40-74A1-4372-9099-E8BE74B81BE3}"/>
-              </a:ext>
-            </a:extLst>
-          </p:cNvPr>
-          <p:cNvSpPr txBox="1"/>
-          <p:nvPr/>
-        </p:nvSpPr>
-        <p:spPr>
-          <a:xfrm>
-            <a:off x="8278261" y="2355318"/>
-            <a:ext cx="495649" cy="215444"/>
-          </a:xfrm>
-          <a:prstGeom prst="rect">
-            <a:avLst/>
-          </a:prstGeom>
-          <a:noFill/>
-        </p:spPr>
-        <p:txBody>
-          <a:bodyPr wrap="none" rtlCol="0">
-            <a:spAutoFit/>
-          </a:bodyPr>
-          <a:lstStyle/>
-          <a:p>
-            <a:r>
-              <a:rPr lang="en-GB" sz="800" b="1" dirty="0">
-                <a:solidFill>
-                  <a:schemeClr val="bg2">
-                    <a:lumMod val="50000"/>
-                  </a:schemeClr>
-                </a:solidFill>
-              </a:rPr>
-              <a:t>Taiwan</a:t>
-            </a:r>
-            <a:endParaRPr lang="nl-NL" b="1" dirty="0">
-              <a:solidFill>
-                <a:schemeClr val="bg2">
-                  <a:lumMod val="50000"/>
-                </a:schemeClr>
-              </a:solidFill>
-            </a:endParaRPr>
-          </a:p>
-        </p:txBody>
-      </p:sp>
-      <p:sp>
-        <p:nvSpPr>
-          <p:cNvPr id="229" name="TextBox 228">
-            <a:extLst>
-              <a:ext uri="{FF2B5EF4-FFF2-40B4-BE49-F238E27FC236}">
-                <a16:creationId xmlns:a16="http://schemas.microsoft.com/office/drawing/2014/main" id="{98A362B0-FB4E-4C02-9F40-007C8F1D7CE9}"/>
-              </a:ext>
-            </a:extLst>
-          </p:cNvPr>
-          <p:cNvSpPr txBox="1"/>
-          <p:nvPr/>
-        </p:nvSpPr>
-        <p:spPr>
-          <a:xfrm>
-            <a:off x="8335394" y="2067065"/>
-            <a:ext cx="425116" cy="215444"/>
-          </a:xfrm>
-          <a:prstGeom prst="rect">
-            <a:avLst/>
-          </a:prstGeom>
-          <a:noFill/>
-        </p:spPr>
-        <p:txBody>
-          <a:bodyPr wrap="none" rtlCol="0">
-            <a:spAutoFit/>
-          </a:bodyPr>
-          <a:lstStyle/>
-          <a:p>
-            <a:r>
-              <a:rPr lang="en-GB" sz="800" b="1" dirty="0">
-                <a:solidFill>
-                  <a:schemeClr val="bg2">
-                    <a:lumMod val="50000"/>
-                  </a:schemeClr>
-                </a:solidFill>
-              </a:rPr>
-              <a:t>China</a:t>
-            </a:r>
-            <a:endParaRPr lang="nl-NL" b="1" dirty="0">
-              <a:solidFill>
-                <a:schemeClr val="bg2">
-                  <a:lumMod val="50000"/>
-                </a:schemeClr>
-              </a:solidFill>
-            </a:endParaRPr>
-          </a:p>
-        </p:txBody>
-      </p:sp>
-      <p:sp>
-        <p:nvSpPr>
-          <p:cNvPr id="230" name="TextBox 229">
-            <a:extLst>
-              <a:ext uri="{FF2B5EF4-FFF2-40B4-BE49-F238E27FC236}">
-                <a16:creationId xmlns:a16="http://schemas.microsoft.com/office/drawing/2014/main" id="{4B1E5F4F-EDB7-4087-82C4-C3E36328351E}"/>
-              </a:ext>
-            </a:extLst>
-          </p:cNvPr>
-          <p:cNvSpPr txBox="1"/>
-          <p:nvPr/>
-        </p:nvSpPr>
-        <p:spPr>
-          <a:xfrm>
-            <a:off x="8344965" y="1767413"/>
-            <a:ext cx="429926" cy="215444"/>
-          </a:xfrm>
-          <a:prstGeom prst="rect">
-            <a:avLst/>
-          </a:prstGeom>
-          <a:noFill/>
-        </p:spPr>
-        <p:txBody>
-          <a:bodyPr wrap="none" rtlCol="0">
-            <a:spAutoFit/>
-          </a:bodyPr>
-          <a:lstStyle/>
-          <a:p>
-            <a:r>
-              <a:rPr lang="en-GB" sz="800" b="1" dirty="0">
-                <a:solidFill>
-                  <a:schemeClr val="bg2">
-                    <a:lumMod val="50000"/>
-                  </a:schemeClr>
-                </a:solidFill>
-              </a:rPr>
-              <a:t>Japan</a:t>
-            </a:r>
-            <a:endParaRPr lang="nl-NL" b="1" dirty="0">
-              <a:solidFill>
-                <a:schemeClr val="bg2">
-                  <a:lumMod val="50000"/>
-                </a:schemeClr>
-              </a:solidFill>
-            </a:endParaRPr>
-          </a:p>
-        </p:txBody>
-      </p:sp>
+              </a:endParaRPr>
+            </a:p>
+          </p:txBody>
+        </p:sp>
+      </p:grpSp>
     </p:spTree>
     <p:extLst>
       <p:ext uri="{BB962C8B-B14F-4D97-AF65-F5344CB8AC3E}">

</xml_diff>